<commit_message>
Sean - Added content to Findings slides of PPT
</commit_message>
<xml_diff>
--- a/Bounce_Back 24012018v1.pptx
+++ b/Bounce_Back 24012018v1.pptx
@@ -233,7 +233,7 @@
             <a:fld id="{C449B9E2-F6E0-43F1-9141-B8839419D296}" type="datetimeFigureOut">
               <a:rPr lang="en-US" smtClean="0"/>
               <a:pPr/>
-              <a:t>1/31/2018</a:t>
+              <a:t>2/1/18</a:t>
             </a:fld>
             <a:endParaRPr lang="en-US"/>
           </a:p>
@@ -2315,7 +2315,7 @@
             <a:fld id="{17450E51-4C5E-4BB5-8E54-A147694BC1CA}" type="datetimeFigureOut">
               <a:rPr lang="en-US" smtClean="0"/>
               <a:pPr/>
-              <a:t>1/31/2018</a:t>
+              <a:t>2/1/18</a:t>
             </a:fld>
             <a:endParaRPr lang="en-US"/>
           </a:p>
@@ -2480,7 +2480,7 @@
             <a:fld id="{17450E51-4C5E-4BB5-8E54-A147694BC1CA}" type="datetimeFigureOut">
               <a:rPr lang="en-US" smtClean="0"/>
               <a:pPr/>
-              <a:t>1/31/2018</a:t>
+              <a:t>2/1/18</a:t>
             </a:fld>
             <a:endParaRPr lang="en-US"/>
           </a:p>
@@ -2655,7 +2655,7 @@
             <a:fld id="{17450E51-4C5E-4BB5-8E54-A147694BC1CA}" type="datetimeFigureOut">
               <a:rPr lang="en-US" smtClean="0"/>
               <a:pPr/>
-              <a:t>1/31/2018</a:t>
+              <a:t>2/1/18</a:t>
             </a:fld>
             <a:endParaRPr lang="en-US"/>
           </a:p>
@@ -2820,7 +2820,7 @@
             <a:fld id="{17450E51-4C5E-4BB5-8E54-A147694BC1CA}" type="datetimeFigureOut">
               <a:rPr lang="en-US" smtClean="0"/>
               <a:pPr/>
-              <a:t>1/31/2018</a:t>
+              <a:t>2/1/18</a:t>
             </a:fld>
             <a:endParaRPr lang="en-US"/>
           </a:p>
@@ -3062,7 +3062,7 @@
             <a:fld id="{17450E51-4C5E-4BB5-8E54-A147694BC1CA}" type="datetimeFigureOut">
               <a:rPr lang="en-US" smtClean="0"/>
               <a:pPr/>
-              <a:t>1/31/2018</a:t>
+              <a:t>2/1/18</a:t>
             </a:fld>
             <a:endParaRPr lang="en-US"/>
           </a:p>
@@ -3344,7 +3344,7 @@
             <a:fld id="{17450E51-4C5E-4BB5-8E54-A147694BC1CA}" type="datetimeFigureOut">
               <a:rPr lang="en-US" smtClean="0"/>
               <a:pPr/>
-              <a:t>1/31/2018</a:t>
+              <a:t>2/1/18</a:t>
             </a:fld>
             <a:endParaRPr lang="en-US"/>
           </a:p>
@@ -3760,7 +3760,7 @@
             <a:fld id="{17450E51-4C5E-4BB5-8E54-A147694BC1CA}" type="datetimeFigureOut">
               <a:rPr lang="en-US" smtClean="0"/>
               <a:pPr/>
-              <a:t>1/31/2018</a:t>
+              <a:t>2/1/18</a:t>
             </a:fld>
             <a:endParaRPr lang="en-US"/>
           </a:p>
@@ -3874,7 +3874,7 @@
             <a:fld id="{17450E51-4C5E-4BB5-8E54-A147694BC1CA}" type="datetimeFigureOut">
               <a:rPr lang="en-US" smtClean="0"/>
               <a:pPr/>
-              <a:t>1/31/2018</a:t>
+              <a:t>2/1/18</a:t>
             </a:fld>
             <a:endParaRPr lang="en-US"/>
           </a:p>
@@ -3966,7 +3966,7 @@
             <a:fld id="{17450E51-4C5E-4BB5-8E54-A147694BC1CA}" type="datetimeFigureOut">
               <a:rPr lang="en-US" smtClean="0"/>
               <a:pPr/>
-              <a:t>1/31/2018</a:t>
+              <a:t>2/1/18</a:t>
             </a:fld>
             <a:endParaRPr lang="en-US"/>
           </a:p>
@@ -4238,7 +4238,7 @@
             <a:fld id="{17450E51-4C5E-4BB5-8E54-A147694BC1CA}" type="datetimeFigureOut">
               <a:rPr lang="en-US" smtClean="0"/>
               <a:pPr/>
-              <a:t>1/31/2018</a:t>
+              <a:t>2/1/18</a:t>
             </a:fld>
             <a:endParaRPr lang="en-US"/>
           </a:p>
@@ -4487,7 +4487,7 @@
             <a:fld id="{17450E51-4C5E-4BB5-8E54-A147694BC1CA}" type="datetimeFigureOut">
               <a:rPr lang="en-US" smtClean="0"/>
               <a:pPr/>
-              <a:t>1/31/2018</a:t>
+              <a:t>2/1/18</a:t>
             </a:fld>
             <a:endParaRPr lang="en-US"/>
           </a:p>
@@ -4695,7 +4695,7 @@
             <a:fld id="{17450E51-4C5E-4BB5-8E54-A147694BC1CA}" type="datetimeFigureOut">
               <a:rPr lang="en-US" smtClean="0"/>
               <a:pPr/>
-              <a:t>1/31/2018</a:t>
+              <a:t>2/1/18</a:t>
             </a:fld>
             <a:endParaRPr lang="en-US"/>
           </a:p>
@@ -5086,7 +5086,7 @@
           <a:graphicData uri="http://schemas.openxmlformats.org/presentationml/2006/ole">
             <mc:AlternateContent xmlns:mc="http://schemas.openxmlformats.org/markup-compatibility/2006">
               <mc:Choice xmlns:v="urn:schemas-microsoft-com:vml" Requires="v">
-                <p:oleObj spid="_x0000_s1026" r:id="rId5" imgW="0" imgH="0" progId="TCLayout.ActiveDocument.1">
+                <p:oleObj spid="_x0000_s1030" r:id="rId5" imgW="0" imgH="0" progId="TCLayout.ActiveDocument.1">
                   <p:embed/>
                 </p:oleObj>
               </mc:Choice>
@@ -5177,7 +5177,7 @@
           <a:p>
             <a:pPr algn="l"/>
             <a:r>
-              <a:rPr lang="en-US" sz="1800" b="1" dirty="0">
+              <a:rPr lang="en-US" sz="2400" b="1" dirty="0">
                 <a:solidFill>
                   <a:srgbClr val="000066"/>
                 </a:solidFill>
@@ -5192,7 +5192,7 @@
           <p:cNvPr id="7" name="TextBox 6">
             <a:extLst>
               <a:ext uri="{FF2B5EF4-FFF2-40B4-BE49-F238E27FC236}">
-                <a16:creationId xmlns:a16="http://schemas.microsoft.com/office/drawing/2014/main" id="{59D6BA0D-75DA-411C-AE80-6B1C75B5F712}"/>
+                <a16:creationId xmlns:a16="http://schemas.microsoft.com/office/drawing/2014/main" xmlns="" id="{59D6BA0D-75DA-411C-AE80-6B1C75B5F712}"/>
               </a:ext>
             </a:extLst>
           </p:cNvPr>
@@ -5355,7 +5355,7 @@
           <a:graphicData uri="http://schemas.openxmlformats.org/presentationml/2006/ole">
             <mc:AlternateContent xmlns:mc="http://schemas.openxmlformats.org/markup-compatibility/2006">
               <mc:Choice xmlns:v="urn:schemas-microsoft-com:vml" Requires="v">
-                <p:oleObj spid="_x0000_s9218" r:id="rId5" imgW="0" imgH="0" progId="TCLayout.ActiveDocument.1">
+                <p:oleObj spid="_x0000_s9221" r:id="rId5" imgW="0" imgH="0" progId="TCLayout.ActiveDocument.1">
                   <p:embed/>
                 </p:oleObj>
               </mc:Choice>
@@ -5461,7 +5461,7 @@
           <p:cNvPr id="13" name="Group 12">
             <a:extLst>
               <a:ext uri="{FF2B5EF4-FFF2-40B4-BE49-F238E27FC236}">
-                <a16:creationId xmlns:a16="http://schemas.microsoft.com/office/drawing/2014/main" id="{AF8D378F-06B0-4C7D-A8DC-3897EBC527B2}"/>
+                <a16:creationId xmlns:a16="http://schemas.microsoft.com/office/drawing/2014/main" xmlns="" id="{AF8D378F-06B0-4C7D-A8DC-3897EBC527B2}"/>
               </a:ext>
             </a:extLst>
           </p:cNvPr>
@@ -5481,7 +5481,7 @@
             <p:cNvPr id="11" name="Rectangle 2">
               <a:extLst>
                 <a:ext uri="{FF2B5EF4-FFF2-40B4-BE49-F238E27FC236}">
-                  <a16:creationId xmlns:a16="http://schemas.microsoft.com/office/drawing/2014/main" id="{340A7B56-754B-452D-844A-C81239CEB0F3}"/>
+                  <a16:creationId xmlns:a16="http://schemas.microsoft.com/office/drawing/2014/main" xmlns="" id="{340A7B56-754B-452D-844A-C81239CEB0F3}"/>
                 </a:ext>
               </a:extLst>
             </p:cNvPr>
@@ -5533,7 +5533,7 @@
             <p:cNvPr id="2" name="Picture 1">
               <a:extLst>
                 <a:ext uri="{FF2B5EF4-FFF2-40B4-BE49-F238E27FC236}">
-                  <a16:creationId xmlns:a16="http://schemas.microsoft.com/office/drawing/2014/main" id="{B69BA337-7192-4723-A968-65052031615B}"/>
+                  <a16:creationId xmlns:a16="http://schemas.microsoft.com/office/drawing/2014/main" xmlns="" id="{B69BA337-7192-4723-A968-65052031615B}"/>
                 </a:ext>
               </a:extLst>
             </p:cNvPr>
@@ -5563,7 +5563,7 @@
             <p:cNvPr id="20" name="Rectangle 19">
               <a:extLst>
                 <a:ext uri="{FF2B5EF4-FFF2-40B4-BE49-F238E27FC236}">
-                  <a16:creationId xmlns:a16="http://schemas.microsoft.com/office/drawing/2014/main" id="{F52B8517-3790-47B2-B06A-A7D51337D86B}"/>
+                  <a16:creationId xmlns:a16="http://schemas.microsoft.com/office/drawing/2014/main" xmlns="" id="{F52B8517-3790-47B2-B06A-A7D51337D86B}"/>
                 </a:ext>
               </a:extLst>
             </p:cNvPr>
@@ -5617,7 +5617,7 @@
           <p:cNvPr id="26" name="Group 25">
             <a:extLst>
               <a:ext uri="{FF2B5EF4-FFF2-40B4-BE49-F238E27FC236}">
-                <a16:creationId xmlns:a16="http://schemas.microsoft.com/office/drawing/2014/main" id="{09E04D29-E4EB-43C5-91C3-07324CA56B40}"/>
+                <a16:creationId xmlns:a16="http://schemas.microsoft.com/office/drawing/2014/main" xmlns="" id="{09E04D29-E4EB-43C5-91C3-07324CA56B40}"/>
               </a:ext>
             </a:extLst>
           </p:cNvPr>
@@ -5637,7 +5637,7 @@
             <p:cNvPr id="8" name="Picture 7">
               <a:extLst>
                 <a:ext uri="{FF2B5EF4-FFF2-40B4-BE49-F238E27FC236}">
-                  <a16:creationId xmlns:a16="http://schemas.microsoft.com/office/drawing/2014/main" id="{3D694C7A-BA08-4C78-9C38-C235F05AD0BC}"/>
+                  <a16:creationId xmlns:a16="http://schemas.microsoft.com/office/drawing/2014/main" xmlns="" id="{3D694C7A-BA08-4C78-9C38-C235F05AD0BC}"/>
                 </a:ext>
               </a:extLst>
             </p:cNvPr>
@@ -5667,7 +5667,7 @@
             <p:cNvPr id="15" name="Rectangle 2">
               <a:extLst>
                 <a:ext uri="{FF2B5EF4-FFF2-40B4-BE49-F238E27FC236}">
-                  <a16:creationId xmlns:a16="http://schemas.microsoft.com/office/drawing/2014/main" id="{C8362624-861F-43A9-B40A-5DE35CE921CE}"/>
+                  <a16:creationId xmlns:a16="http://schemas.microsoft.com/office/drawing/2014/main" xmlns="" id="{C8362624-861F-43A9-B40A-5DE35CE921CE}"/>
                 </a:ext>
               </a:extLst>
             </p:cNvPr>
@@ -5719,7 +5719,7 @@
             <p:cNvPr id="21" name="Rectangle 20">
               <a:extLst>
                 <a:ext uri="{FF2B5EF4-FFF2-40B4-BE49-F238E27FC236}">
-                  <a16:creationId xmlns:a16="http://schemas.microsoft.com/office/drawing/2014/main" id="{D6B3708A-7098-4058-AD99-BEE78F192AB7}"/>
+                  <a16:creationId xmlns:a16="http://schemas.microsoft.com/office/drawing/2014/main" xmlns="" id="{D6B3708A-7098-4058-AD99-BEE78F192AB7}"/>
                 </a:ext>
               </a:extLst>
             </p:cNvPr>
@@ -5773,7 +5773,7 @@
           <p:cNvPr id="27" name="Group 26">
             <a:extLst>
               <a:ext uri="{FF2B5EF4-FFF2-40B4-BE49-F238E27FC236}">
-                <a16:creationId xmlns:a16="http://schemas.microsoft.com/office/drawing/2014/main" id="{6837C4E7-E6DD-4169-B741-FD7251C7CD8E}"/>
+                <a16:creationId xmlns:a16="http://schemas.microsoft.com/office/drawing/2014/main" xmlns="" id="{6837C4E7-E6DD-4169-B741-FD7251C7CD8E}"/>
               </a:ext>
             </a:extLst>
           </p:cNvPr>
@@ -5793,7 +5793,7 @@
             <p:cNvPr id="14" name="Picture 13">
               <a:extLst>
                 <a:ext uri="{FF2B5EF4-FFF2-40B4-BE49-F238E27FC236}">
-                  <a16:creationId xmlns:a16="http://schemas.microsoft.com/office/drawing/2014/main" id="{32BAD7AC-85E4-4FE2-A08A-6F0AF3FAC27B}"/>
+                  <a16:creationId xmlns:a16="http://schemas.microsoft.com/office/drawing/2014/main" xmlns="" id="{32BAD7AC-85E4-4FE2-A08A-6F0AF3FAC27B}"/>
                 </a:ext>
               </a:extLst>
             </p:cNvPr>
@@ -5823,7 +5823,7 @@
             <p:cNvPr id="19" name="Rectangle 2">
               <a:extLst>
                 <a:ext uri="{FF2B5EF4-FFF2-40B4-BE49-F238E27FC236}">
-                  <a16:creationId xmlns:a16="http://schemas.microsoft.com/office/drawing/2014/main" id="{11A81F7D-89AE-4543-AC28-D15A3978268E}"/>
+                  <a16:creationId xmlns:a16="http://schemas.microsoft.com/office/drawing/2014/main" xmlns="" id="{11A81F7D-89AE-4543-AC28-D15A3978268E}"/>
                 </a:ext>
               </a:extLst>
             </p:cNvPr>
@@ -5872,7 +5872,7 @@
             <p:cNvPr id="24" name="Rectangle 23">
               <a:extLst>
                 <a:ext uri="{FF2B5EF4-FFF2-40B4-BE49-F238E27FC236}">
-                  <a16:creationId xmlns:a16="http://schemas.microsoft.com/office/drawing/2014/main" id="{FE291957-6303-4956-B24C-E9D19A6D1282}"/>
+                  <a16:creationId xmlns:a16="http://schemas.microsoft.com/office/drawing/2014/main" xmlns="" id="{FE291957-6303-4956-B24C-E9D19A6D1282}"/>
                 </a:ext>
               </a:extLst>
             </p:cNvPr>
@@ -5926,7 +5926,7 @@
           <p:cNvPr id="25" name="Group 24">
             <a:extLst>
               <a:ext uri="{FF2B5EF4-FFF2-40B4-BE49-F238E27FC236}">
-                <a16:creationId xmlns:a16="http://schemas.microsoft.com/office/drawing/2014/main" id="{3EA8F59B-A5D2-43EB-8F99-2AED90B6D324}"/>
+                <a16:creationId xmlns:a16="http://schemas.microsoft.com/office/drawing/2014/main" xmlns="" id="{3EA8F59B-A5D2-43EB-8F99-2AED90B6D324}"/>
               </a:ext>
             </a:extLst>
           </p:cNvPr>
@@ -5946,7 +5946,7 @@
             <p:cNvPr id="12" name="Picture 11">
               <a:extLst>
                 <a:ext uri="{FF2B5EF4-FFF2-40B4-BE49-F238E27FC236}">
-                  <a16:creationId xmlns:a16="http://schemas.microsoft.com/office/drawing/2014/main" id="{F5047BBE-332B-48E6-B054-5D95898F1882}"/>
+                  <a16:creationId xmlns:a16="http://schemas.microsoft.com/office/drawing/2014/main" xmlns="" id="{F5047BBE-332B-48E6-B054-5D95898F1882}"/>
                 </a:ext>
               </a:extLst>
             </p:cNvPr>
@@ -5976,7 +5976,7 @@
             <p:cNvPr id="17" name="Rectangle 2">
               <a:extLst>
                 <a:ext uri="{FF2B5EF4-FFF2-40B4-BE49-F238E27FC236}">
-                  <a16:creationId xmlns:a16="http://schemas.microsoft.com/office/drawing/2014/main" id="{34796B36-8460-4AA7-BB8F-D2D4FE1A7AE5}"/>
+                  <a16:creationId xmlns:a16="http://schemas.microsoft.com/office/drawing/2014/main" xmlns="" id="{34796B36-8460-4AA7-BB8F-D2D4FE1A7AE5}"/>
                 </a:ext>
               </a:extLst>
             </p:cNvPr>
@@ -6028,7 +6028,7 @@
             <p:cNvPr id="23" name="Rectangle 22">
               <a:extLst>
                 <a:ext uri="{FF2B5EF4-FFF2-40B4-BE49-F238E27FC236}">
-                  <a16:creationId xmlns:a16="http://schemas.microsoft.com/office/drawing/2014/main" id="{B13B3A79-E38B-4AAE-A79C-3C3B02C83F06}"/>
+                  <a16:creationId xmlns:a16="http://schemas.microsoft.com/office/drawing/2014/main" xmlns="" id="{B13B3A79-E38B-4AAE-A79C-3C3B02C83F06}"/>
                 </a:ext>
               </a:extLst>
             </p:cNvPr>
@@ -6082,7 +6082,7 @@
           <p:cNvPr id="5" name="Group 4">
             <a:extLst>
               <a:ext uri="{FF2B5EF4-FFF2-40B4-BE49-F238E27FC236}">
-                <a16:creationId xmlns:a16="http://schemas.microsoft.com/office/drawing/2014/main" id="{70E882FA-D878-4031-AE0D-F2063BCDFEFD}"/>
+                <a16:creationId xmlns:a16="http://schemas.microsoft.com/office/drawing/2014/main" xmlns="" id="{70E882FA-D878-4031-AE0D-F2063BCDFEFD}"/>
               </a:ext>
             </a:extLst>
           </p:cNvPr>
@@ -6102,7 +6102,7 @@
             <p:cNvPr id="9" name="Picture 8">
               <a:extLst>
                 <a:ext uri="{FF2B5EF4-FFF2-40B4-BE49-F238E27FC236}">
-                  <a16:creationId xmlns:a16="http://schemas.microsoft.com/office/drawing/2014/main" id="{BAF1E3F6-0C2C-480D-B395-F4CFBB522C23}"/>
+                  <a16:creationId xmlns:a16="http://schemas.microsoft.com/office/drawing/2014/main" xmlns="" id="{BAF1E3F6-0C2C-480D-B395-F4CFBB522C23}"/>
                 </a:ext>
               </a:extLst>
             </p:cNvPr>
@@ -6132,7 +6132,7 @@
             <p:cNvPr id="16" name="Rectangle 2">
               <a:extLst>
                 <a:ext uri="{FF2B5EF4-FFF2-40B4-BE49-F238E27FC236}">
-                  <a16:creationId xmlns:a16="http://schemas.microsoft.com/office/drawing/2014/main" id="{9726BE47-F08A-411E-B579-8E0033EF1C64}"/>
+                  <a16:creationId xmlns:a16="http://schemas.microsoft.com/office/drawing/2014/main" xmlns="" id="{9726BE47-F08A-411E-B579-8E0033EF1C64}"/>
                 </a:ext>
               </a:extLst>
             </p:cNvPr>
@@ -6184,7 +6184,7 @@
             <p:cNvPr id="22" name="Rectangle 21">
               <a:extLst>
                 <a:ext uri="{FF2B5EF4-FFF2-40B4-BE49-F238E27FC236}">
-                  <a16:creationId xmlns:a16="http://schemas.microsoft.com/office/drawing/2014/main" id="{1FD29097-FDFD-438B-B3A7-17FBC442A115}"/>
+                  <a16:creationId xmlns:a16="http://schemas.microsoft.com/office/drawing/2014/main" xmlns="" id="{1FD29097-FDFD-438B-B3A7-17FBC442A115}"/>
                 </a:ext>
               </a:extLst>
             </p:cNvPr>
@@ -6538,7 +6538,7 @@
           <a:graphicData uri="http://schemas.openxmlformats.org/presentationml/2006/ole">
             <mc:AlternateContent xmlns:mc="http://schemas.openxmlformats.org/markup-compatibility/2006">
               <mc:Choice xmlns:v="urn:schemas-microsoft-com:vml" Requires="v">
-                <p:oleObj spid="_x0000_s10242" r:id="rId5" imgW="0" imgH="0" progId="TCLayout.ActiveDocument.1">
+                <p:oleObj spid="_x0000_s10246" r:id="rId5" imgW="0" imgH="0" progId="TCLayout.ActiveDocument.1">
                   <p:embed/>
                 </p:oleObj>
               </mc:Choice>
@@ -6644,7 +6644,7 @@
           <p:cNvPr id="7" name="TextBox 6">
             <a:extLst>
               <a:ext uri="{FF2B5EF4-FFF2-40B4-BE49-F238E27FC236}">
-                <a16:creationId xmlns:a16="http://schemas.microsoft.com/office/drawing/2014/main" id="{59D6BA0D-75DA-411C-AE80-6B1C75B5F712}"/>
+                <a16:creationId xmlns:a16="http://schemas.microsoft.com/office/drawing/2014/main" xmlns="" id="{59D6BA0D-75DA-411C-AE80-6B1C75B5F712}"/>
               </a:ext>
             </a:extLst>
           </p:cNvPr>
@@ -6722,8 +6722,21 @@
                   <a:srgbClr val="000066"/>
                 </a:solidFill>
               </a:rPr>
-              <a:t>Environmental or Ecological Hazzard</a:t>
-            </a:r>
+              <a:t>Environmental or Ecological </a:t>
+            </a:r>
+            <a:r>
+              <a:rPr lang="en-US" b="1" i="1" dirty="0" smtClean="0">
+                <a:solidFill>
+                  <a:srgbClr val="000066"/>
+                </a:solidFill>
+              </a:rPr>
+              <a:t>Hazard</a:t>
+            </a:r>
+            <a:endParaRPr lang="en-US" b="1" i="1" dirty="0">
+              <a:solidFill>
+                <a:srgbClr val="000066"/>
+              </a:solidFill>
+            </a:endParaRPr>
           </a:p>
           <a:p>
             <a:pPr marL="285750" indent="-285750">
@@ -6736,8 +6749,21 @@
                   <a:srgbClr val="000066"/>
                 </a:solidFill>
               </a:rPr>
-              <a:t>Human Health Hazzard</a:t>
-            </a:r>
+              <a:t>Human Health </a:t>
+            </a:r>
+            <a:r>
+              <a:rPr lang="en-US" b="1" i="1" dirty="0" smtClean="0">
+                <a:solidFill>
+                  <a:srgbClr val="000066"/>
+                </a:solidFill>
+              </a:rPr>
+              <a:t>Hazard</a:t>
+            </a:r>
+            <a:endParaRPr lang="en-US" b="1" i="1" dirty="0">
+              <a:solidFill>
+                <a:srgbClr val="000066"/>
+              </a:solidFill>
+            </a:endParaRPr>
           </a:p>
           <a:p>
             <a:pPr marL="285750" indent="-285750">
@@ -6772,7 +6798,7 @@
           <p:cNvPr id="6" name="TextBox 5">
             <a:extLst>
               <a:ext uri="{FF2B5EF4-FFF2-40B4-BE49-F238E27FC236}">
-                <a16:creationId xmlns:a16="http://schemas.microsoft.com/office/drawing/2014/main" id="{B5445D99-1429-4B9F-AFF3-64CE73903E87}"/>
+                <a16:creationId xmlns:a16="http://schemas.microsoft.com/office/drawing/2014/main" xmlns="" id="{B5445D99-1429-4B9F-AFF3-64CE73903E87}"/>
               </a:ext>
             </a:extLst>
           </p:cNvPr>
@@ -7041,7 +7067,7 @@
           <a:graphicData uri="http://schemas.openxmlformats.org/presentationml/2006/ole">
             <mc:AlternateContent xmlns:mc="http://schemas.openxmlformats.org/markup-compatibility/2006">
               <mc:Choice xmlns:v="urn:schemas-microsoft-com:vml" Requires="v">
-                <p:oleObj spid="_x0000_s11266" r:id="rId5" imgW="0" imgH="0" progId="TCLayout.ActiveDocument.1">
+                <p:oleObj spid="_x0000_s11269" r:id="rId5" imgW="0" imgH="0" progId="TCLayout.ActiveDocument.1">
                   <p:embed/>
                 </p:oleObj>
               </mc:Choice>
@@ -7113,7 +7139,7 @@
           <p:cNvPr id="8" name="Title 40">
             <a:extLst>
               <a:ext uri="{FF2B5EF4-FFF2-40B4-BE49-F238E27FC236}">
-                <a16:creationId xmlns:a16="http://schemas.microsoft.com/office/drawing/2014/main" id="{6D65D641-D69D-4168-BB7D-AD3F200877E3}"/>
+                <a16:creationId xmlns:a16="http://schemas.microsoft.com/office/drawing/2014/main" xmlns="" id="{6D65D641-D69D-4168-BB7D-AD3F200877E3}"/>
               </a:ext>
             </a:extLst>
           </p:cNvPr>
@@ -7153,7 +7179,7 @@
           <p:cNvPr id="3" name="TextBox 2">
             <a:extLst>
               <a:ext uri="{FF2B5EF4-FFF2-40B4-BE49-F238E27FC236}">
-                <a16:creationId xmlns:a16="http://schemas.microsoft.com/office/drawing/2014/main" id="{0BBCD9D6-8729-415F-B524-1885A8D216AD}"/>
+                <a16:creationId xmlns:a16="http://schemas.microsoft.com/office/drawing/2014/main" xmlns="" id="{0BBCD9D6-8729-415F-B524-1885A8D216AD}"/>
               </a:ext>
             </a:extLst>
           </p:cNvPr>
@@ -7221,7 +7247,7 @@
           <p:cNvPr id="4" name="Picture 3">
             <a:extLst>
               <a:ext uri="{FF2B5EF4-FFF2-40B4-BE49-F238E27FC236}">
-                <a16:creationId xmlns:a16="http://schemas.microsoft.com/office/drawing/2014/main" id="{B21AA919-AB25-4407-AD8E-42181958B333}"/>
+                <a16:creationId xmlns:a16="http://schemas.microsoft.com/office/drawing/2014/main" xmlns="" id="{B21AA919-AB25-4407-AD8E-42181958B333}"/>
               </a:ext>
             </a:extLst>
           </p:cNvPr>
@@ -7296,7 +7322,7 @@
           <a:graphicData uri="http://schemas.openxmlformats.org/presentationml/2006/ole">
             <mc:AlternateContent xmlns:mc="http://schemas.openxmlformats.org/markup-compatibility/2006">
               <mc:Choice xmlns:v="urn:schemas-microsoft-com:vml" Requires="v">
-                <p:oleObj spid="_x0000_s12290" r:id="rId5" imgW="0" imgH="0" progId="TCLayout.ActiveDocument.1">
+                <p:oleObj spid="_x0000_s12293" r:id="rId5" imgW="0" imgH="0" progId="TCLayout.ActiveDocument.1">
                   <p:embed/>
                 </p:oleObj>
               </mc:Choice>
@@ -7368,7 +7394,7 @@
           <p:cNvPr id="8" name="Title 40">
             <a:extLst>
               <a:ext uri="{FF2B5EF4-FFF2-40B4-BE49-F238E27FC236}">
-                <a16:creationId xmlns:a16="http://schemas.microsoft.com/office/drawing/2014/main" id="{6D65D641-D69D-4168-BB7D-AD3F200877E3}"/>
+                <a16:creationId xmlns:a16="http://schemas.microsoft.com/office/drawing/2014/main" xmlns="" id="{6D65D641-D69D-4168-BB7D-AD3F200877E3}"/>
               </a:ext>
             </a:extLst>
           </p:cNvPr>
@@ -7408,7 +7434,7 @@
           <p:cNvPr id="3" name="TextBox 2">
             <a:extLst>
               <a:ext uri="{FF2B5EF4-FFF2-40B4-BE49-F238E27FC236}">
-                <a16:creationId xmlns:a16="http://schemas.microsoft.com/office/drawing/2014/main" id="{0BBCD9D6-8729-415F-B524-1885A8D216AD}"/>
+                <a16:creationId xmlns:a16="http://schemas.microsoft.com/office/drawing/2014/main" xmlns="" id="{0BBCD9D6-8729-415F-B524-1885A8D216AD}"/>
               </a:ext>
             </a:extLst>
           </p:cNvPr>
@@ -7481,7 +7507,7 @@
           <p:cNvPr id="2" name="Picture 1">
             <a:extLst>
               <a:ext uri="{FF2B5EF4-FFF2-40B4-BE49-F238E27FC236}">
-                <a16:creationId xmlns:a16="http://schemas.microsoft.com/office/drawing/2014/main" id="{1277F03A-6793-4CBF-99A5-91EB36123803}"/>
+                <a16:creationId xmlns:a16="http://schemas.microsoft.com/office/drawing/2014/main" xmlns="" id="{1277F03A-6793-4CBF-99A5-91EB36123803}"/>
               </a:ext>
             </a:extLst>
           </p:cNvPr>
@@ -7499,7 +7525,7 @@
         <p:spPr>
           <a:xfrm>
             <a:off x="343270" y="2746984"/>
-            <a:ext cx="3466730" cy="3825266"/>
+            <a:ext cx="3847730" cy="3825266"/>
           </a:xfrm>
           <a:prstGeom prst="rect">
             <a:avLst/>
@@ -7511,7 +7537,7 @@
           <p:cNvPr id="5" name="Picture 4">
             <a:extLst>
               <a:ext uri="{FF2B5EF4-FFF2-40B4-BE49-F238E27FC236}">
-                <a16:creationId xmlns:a16="http://schemas.microsoft.com/office/drawing/2014/main" id="{FBD64368-918A-44AB-AC45-358F005CE533}"/>
+                <a16:creationId xmlns:a16="http://schemas.microsoft.com/office/drawing/2014/main" xmlns="" id="{FBD64368-918A-44AB-AC45-358F005CE533}"/>
               </a:ext>
             </a:extLst>
           </p:cNvPr>
@@ -7586,7 +7612,7 @@
           <a:graphicData uri="http://schemas.openxmlformats.org/presentationml/2006/ole">
             <mc:AlternateContent xmlns:mc="http://schemas.openxmlformats.org/markup-compatibility/2006">
               <mc:Choice xmlns:v="urn:schemas-microsoft-com:vml" Requires="v">
-                <p:oleObj spid="_x0000_s13314" r:id="rId5" imgW="0" imgH="0" progId="TCLayout.ActiveDocument.1">
+                <p:oleObj spid="_x0000_s13317" r:id="rId5" imgW="0" imgH="0" progId="TCLayout.ActiveDocument.1">
                   <p:embed/>
                 </p:oleObj>
               </mc:Choice>
@@ -7658,7 +7684,7 @@
           <p:cNvPr id="8" name="Title 40">
             <a:extLst>
               <a:ext uri="{FF2B5EF4-FFF2-40B4-BE49-F238E27FC236}">
-                <a16:creationId xmlns:a16="http://schemas.microsoft.com/office/drawing/2014/main" id="{6D65D641-D69D-4168-BB7D-AD3F200877E3}"/>
+                <a16:creationId xmlns:a16="http://schemas.microsoft.com/office/drawing/2014/main" xmlns="" id="{6D65D641-D69D-4168-BB7D-AD3F200877E3}"/>
               </a:ext>
             </a:extLst>
           </p:cNvPr>
@@ -7698,7 +7724,7 @@
           <p:cNvPr id="3" name="TextBox 2">
             <a:extLst>
               <a:ext uri="{FF2B5EF4-FFF2-40B4-BE49-F238E27FC236}">
-                <a16:creationId xmlns:a16="http://schemas.microsoft.com/office/drawing/2014/main" id="{0BBCD9D6-8729-415F-B524-1885A8D216AD}"/>
+                <a16:creationId xmlns:a16="http://schemas.microsoft.com/office/drawing/2014/main" xmlns="" id="{0BBCD9D6-8729-415F-B524-1885A8D216AD}"/>
               </a:ext>
             </a:extLst>
           </p:cNvPr>
@@ -7746,7 +7772,7 @@
           <p:cNvPr id="4" name="Picture 3">
             <a:extLst>
               <a:ext uri="{FF2B5EF4-FFF2-40B4-BE49-F238E27FC236}">
-                <a16:creationId xmlns:a16="http://schemas.microsoft.com/office/drawing/2014/main" id="{BC4DC7B1-419F-413C-B138-FA2F807D2140}"/>
+                <a16:creationId xmlns:a16="http://schemas.microsoft.com/office/drawing/2014/main" xmlns="" id="{BC4DC7B1-419F-413C-B138-FA2F807D2140}"/>
               </a:ext>
             </a:extLst>
           </p:cNvPr>
@@ -7821,7 +7847,7 @@
           <a:graphicData uri="http://schemas.openxmlformats.org/presentationml/2006/ole">
             <mc:AlternateContent xmlns:mc="http://schemas.openxmlformats.org/markup-compatibility/2006">
               <mc:Choice xmlns:v="urn:schemas-microsoft-com:vml" Requires="v">
-                <p:oleObj spid="_x0000_s14338" r:id="rId5" imgW="0" imgH="0" progId="TCLayout.ActiveDocument.1">
+                <p:oleObj spid="_x0000_s14341" r:id="rId5" imgW="0" imgH="0" progId="TCLayout.ActiveDocument.1">
                   <p:embed/>
                 </p:oleObj>
               </mc:Choice>
@@ -7893,7 +7919,7 @@
           <p:cNvPr id="8" name="Title 40">
             <a:extLst>
               <a:ext uri="{FF2B5EF4-FFF2-40B4-BE49-F238E27FC236}">
-                <a16:creationId xmlns:a16="http://schemas.microsoft.com/office/drawing/2014/main" id="{6D65D641-D69D-4168-BB7D-AD3F200877E3}"/>
+                <a16:creationId xmlns:a16="http://schemas.microsoft.com/office/drawing/2014/main" xmlns="" id="{6D65D641-D69D-4168-BB7D-AD3F200877E3}"/>
               </a:ext>
             </a:extLst>
           </p:cNvPr>
@@ -7933,7 +7959,7 @@
           <p:cNvPr id="3" name="TextBox 2">
             <a:extLst>
               <a:ext uri="{FF2B5EF4-FFF2-40B4-BE49-F238E27FC236}">
-                <a16:creationId xmlns:a16="http://schemas.microsoft.com/office/drawing/2014/main" id="{0BBCD9D6-8729-415F-B524-1885A8D216AD}"/>
+                <a16:creationId xmlns:a16="http://schemas.microsoft.com/office/drawing/2014/main" xmlns="" id="{0BBCD9D6-8729-415F-B524-1885A8D216AD}"/>
               </a:ext>
             </a:extLst>
           </p:cNvPr>
@@ -7981,7 +8007,7 @@
           <p:cNvPr id="2" name="Picture 1">
             <a:extLst>
               <a:ext uri="{FF2B5EF4-FFF2-40B4-BE49-F238E27FC236}">
-                <a16:creationId xmlns:a16="http://schemas.microsoft.com/office/drawing/2014/main" id="{9BEDBBD5-CD56-47A4-A64A-82670CE6E43B}"/>
+                <a16:creationId xmlns:a16="http://schemas.microsoft.com/office/drawing/2014/main" xmlns="" id="{9BEDBBD5-CD56-47A4-A64A-82670CE6E43B}"/>
               </a:ext>
             </a:extLst>
           </p:cNvPr>
@@ -8056,7 +8082,7 @@
           <a:graphicData uri="http://schemas.openxmlformats.org/presentationml/2006/ole">
             <mc:AlternateContent xmlns:mc="http://schemas.openxmlformats.org/markup-compatibility/2006">
               <mc:Choice xmlns:v="urn:schemas-microsoft-com:vml" Requires="v">
-                <p:oleObj spid="_x0000_s15362" r:id="rId5" imgW="0" imgH="0" progId="TCLayout.ActiveDocument.1">
+                <p:oleObj spid="_x0000_s15365" r:id="rId5" imgW="0" imgH="0" progId="TCLayout.ActiveDocument.1">
                   <p:embed/>
                 </p:oleObj>
               </mc:Choice>
@@ -8128,7 +8154,7 @@
           <p:cNvPr id="8" name="Title 40">
             <a:extLst>
               <a:ext uri="{FF2B5EF4-FFF2-40B4-BE49-F238E27FC236}">
-                <a16:creationId xmlns:a16="http://schemas.microsoft.com/office/drawing/2014/main" id="{6D65D641-D69D-4168-BB7D-AD3F200877E3}"/>
+                <a16:creationId xmlns:a16="http://schemas.microsoft.com/office/drawing/2014/main" xmlns="" id="{6D65D641-D69D-4168-BB7D-AD3F200877E3}"/>
               </a:ext>
             </a:extLst>
           </p:cNvPr>
@@ -8168,7 +8194,7 @@
           <p:cNvPr id="3" name="TextBox 2">
             <a:extLst>
               <a:ext uri="{FF2B5EF4-FFF2-40B4-BE49-F238E27FC236}">
-                <a16:creationId xmlns:a16="http://schemas.microsoft.com/office/drawing/2014/main" id="{0BBCD9D6-8729-415F-B524-1885A8D216AD}"/>
+                <a16:creationId xmlns:a16="http://schemas.microsoft.com/office/drawing/2014/main" xmlns="" id="{0BBCD9D6-8729-415F-B524-1885A8D216AD}"/>
               </a:ext>
             </a:extLst>
           </p:cNvPr>
@@ -8226,7 +8252,7 @@
           <p:cNvPr id="2" name="Picture 1">
             <a:extLst>
               <a:ext uri="{FF2B5EF4-FFF2-40B4-BE49-F238E27FC236}">
-                <a16:creationId xmlns:a16="http://schemas.microsoft.com/office/drawing/2014/main" id="{833A50E2-178D-4567-869C-312E4F748BD1}"/>
+                <a16:creationId xmlns:a16="http://schemas.microsoft.com/office/drawing/2014/main" xmlns="" id="{833A50E2-178D-4567-869C-312E4F748BD1}"/>
               </a:ext>
             </a:extLst>
           </p:cNvPr>
@@ -8301,7 +8327,7 @@
           <a:graphicData uri="http://schemas.openxmlformats.org/presentationml/2006/ole">
             <mc:AlternateContent xmlns:mc="http://schemas.openxmlformats.org/markup-compatibility/2006">
               <mc:Choice xmlns:v="urn:schemas-microsoft-com:vml" Requires="v">
-                <p:oleObj spid="_x0000_s16386" r:id="rId5" imgW="0" imgH="0" progId="TCLayout.ActiveDocument.1">
+                <p:oleObj spid="_x0000_s16389" r:id="rId5" imgW="0" imgH="0" progId="TCLayout.ActiveDocument.1">
                   <p:embed/>
                 </p:oleObj>
               </mc:Choice>
@@ -8373,7 +8399,7 @@
           <p:cNvPr id="8" name="Title 40">
             <a:extLst>
               <a:ext uri="{FF2B5EF4-FFF2-40B4-BE49-F238E27FC236}">
-                <a16:creationId xmlns:a16="http://schemas.microsoft.com/office/drawing/2014/main" id="{6D65D641-D69D-4168-BB7D-AD3F200877E3}"/>
+                <a16:creationId xmlns:a16="http://schemas.microsoft.com/office/drawing/2014/main" xmlns="" id="{6D65D641-D69D-4168-BB7D-AD3F200877E3}"/>
               </a:ext>
             </a:extLst>
           </p:cNvPr>
@@ -8413,7 +8439,7 @@
           <p:cNvPr id="3" name="TextBox 2">
             <a:extLst>
               <a:ext uri="{FF2B5EF4-FFF2-40B4-BE49-F238E27FC236}">
-                <a16:creationId xmlns:a16="http://schemas.microsoft.com/office/drawing/2014/main" id="{0BBCD9D6-8729-415F-B524-1885A8D216AD}"/>
+                <a16:creationId xmlns:a16="http://schemas.microsoft.com/office/drawing/2014/main" xmlns="" id="{0BBCD9D6-8729-415F-B524-1885A8D216AD}"/>
               </a:ext>
             </a:extLst>
           </p:cNvPr>
@@ -8478,7 +8504,7 @@
           <p:cNvPr id="2" name="Picture 1">
             <a:extLst>
               <a:ext uri="{FF2B5EF4-FFF2-40B4-BE49-F238E27FC236}">
-                <a16:creationId xmlns:a16="http://schemas.microsoft.com/office/drawing/2014/main" id="{833A50E2-178D-4567-869C-312E4F748BD1}"/>
+                <a16:creationId xmlns:a16="http://schemas.microsoft.com/office/drawing/2014/main" xmlns="" id="{833A50E2-178D-4567-869C-312E4F748BD1}"/>
               </a:ext>
             </a:extLst>
           </p:cNvPr>
@@ -8508,7 +8534,7 @@
           <p:cNvPr id="4" name="Oval 3">
             <a:extLst>
               <a:ext uri="{FF2B5EF4-FFF2-40B4-BE49-F238E27FC236}">
-                <a16:creationId xmlns:a16="http://schemas.microsoft.com/office/drawing/2014/main" id="{7223C791-FAB9-40DE-960C-238B4FF11214}"/>
+                <a16:creationId xmlns:a16="http://schemas.microsoft.com/office/drawing/2014/main" xmlns="" id="{7223C791-FAB9-40DE-960C-238B4FF11214}"/>
               </a:ext>
             </a:extLst>
           </p:cNvPr>
@@ -8605,7 +8631,7 @@
           <a:graphicData uri="http://schemas.openxmlformats.org/presentationml/2006/ole">
             <mc:AlternateContent xmlns:mc="http://schemas.openxmlformats.org/markup-compatibility/2006">
               <mc:Choice xmlns:v="urn:schemas-microsoft-com:vml" Requires="v">
-                <p:oleObj spid="_x0000_s17410" r:id="rId5" imgW="0" imgH="0" progId="TCLayout.ActiveDocument.1">
+                <p:oleObj spid="_x0000_s17413" r:id="rId5" imgW="0" imgH="0" progId="TCLayout.ActiveDocument.1">
                   <p:embed/>
                 </p:oleObj>
               </mc:Choice>
@@ -8677,7 +8703,7 @@
           <p:cNvPr id="8" name="Title 40">
             <a:extLst>
               <a:ext uri="{FF2B5EF4-FFF2-40B4-BE49-F238E27FC236}">
-                <a16:creationId xmlns:a16="http://schemas.microsoft.com/office/drawing/2014/main" id="{6D65D641-D69D-4168-BB7D-AD3F200877E3}"/>
+                <a16:creationId xmlns:a16="http://schemas.microsoft.com/office/drawing/2014/main" xmlns="" id="{6D65D641-D69D-4168-BB7D-AD3F200877E3}"/>
               </a:ext>
             </a:extLst>
           </p:cNvPr>
@@ -8717,7 +8743,7 @@
           <p:cNvPr id="3" name="TextBox 2">
             <a:extLst>
               <a:ext uri="{FF2B5EF4-FFF2-40B4-BE49-F238E27FC236}">
-                <a16:creationId xmlns:a16="http://schemas.microsoft.com/office/drawing/2014/main" id="{0BBCD9D6-8729-415F-B524-1885A8D216AD}"/>
+                <a16:creationId xmlns:a16="http://schemas.microsoft.com/office/drawing/2014/main" xmlns="" id="{0BBCD9D6-8729-415F-B524-1885A8D216AD}"/>
               </a:ext>
             </a:extLst>
           </p:cNvPr>
@@ -8782,7 +8808,7 @@
           <p:cNvPr id="5" name="Picture 4">
             <a:extLst>
               <a:ext uri="{FF2B5EF4-FFF2-40B4-BE49-F238E27FC236}">
-                <a16:creationId xmlns:a16="http://schemas.microsoft.com/office/drawing/2014/main" id="{F99B3DC4-E98C-41C8-ABB1-D05095A80214}"/>
+                <a16:creationId xmlns:a16="http://schemas.microsoft.com/office/drawing/2014/main" xmlns="" id="{F99B3DC4-E98C-41C8-ABB1-D05095A80214}"/>
               </a:ext>
             </a:extLst>
           </p:cNvPr>
@@ -8857,7 +8883,7 @@
           <a:graphicData uri="http://schemas.openxmlformats.org/presentationml/2006/ole">
             <mc:AlternateContent xmlns:mc="http://schemas.openxmlformats.org/markup-compatibility/2006">
               <mc:Choice xmlns:v="urn:schemas-microsoft-com:vml" Requires="v">
-                <p:oleObj spid="_x0000_s18434" r:id="rId5" imgW="0" imgH="0" progId="TCLayout.ActiveDocument.1">
+                <p:oleObj spid="_x0000_s18437" r:id="rId5" imgW="0" imgH="0" progId="TCLayout.ActiveDocument.1">
                   <p:embed/>
                 </p:oleObj>
               </mc:Choice>
@@ -8929,7 +8955,7 @@
           <p:cNvPr id="8" name="Title 40">
             <a:extLst>
               <a:ext uri="{FF2B5EF4-FFF2-40B4-BE49-F238E27FC236}">
-                <a16:creationId xmlns:a16="http://schemas.microsoft.com/office/drawing/2014/main" id="{6D65D641-D69D-4168-BB7D-AD3F200877E3}"/>
+                <a16:creationId xmlns:a16="http://schemas.microsoft.com/office/drawing/2014/main" xmlns="" id="{6D65D641-D69D-4168-BB7D-AD3F200877E3}"/>
               </a:ext>
             </a:extLst>
           </p:cNvPr>
@@ -8969,7 +8995,7 @@
           <p:cNvPr id="3" name="TextBox 2">
             <a:extLst>
               <a:ext uri="{FF2B5EF4-FFF2-40B4-BE49-F238E27FC236}">
-                <a16:creationId xmlns:a16="http://schemas.microsoft.com/office/drawing/2014/main" id="{0BBCD9D6-8729-415F-B524-1885A8D216AD}"/>
+                <a16:creationId xmlns:a16="http://schemas.microsoft.com/office/drawing/2014/main" xmlns="" id="{0BBCD9D6-8729-415F-B524-1885A8D216AD}"/>
               </a:ext>
             </a:extLst>
           </p:cNvPr>
@@ -9047,7 +9073,7 @@
           <p:cNvPr id="2" name="Picture 1">
             <a:extLst>
               <a:ext uri="{FF2B5EF4-FFF2-40B4-BE49-F238E27FC236}">
-                <a16:creationId xmlns:a16="http://schemas.microsoft.com/office/drawing/2014/main" id="{6D6B3A07-5B38-4412-8E62-22985BE45DCA}"/>
+                <a16:creationId xmlns:a16="http://schemas.microsoft.com/office/drawing/2014/main" xmlns="" id="{6D6B3A07-5B38-4412-8E62-22985BE45DCA}"/>
               </a:ext>
             </a:extLst>
           </p:cNvPr>
@@ -9077,7 +9103,7 @@
           <p:cNvPr id="4" name="TextBox 3">
             <a:extLst>
               <a:ext uri="{FF2B5EF4-FFF2-40B4-BE49-F238E27FC236}">
-                <a16:creationId xmlns:a16="http://schemas.microsoft.com/office/drawing/2014/main" id="{C5C403EE-515C-4FF5-9778-90E68BE109B9}"/>
+                <a16:creationId xmlns:a16="http://schemas.microsoft.com/office/drawing/2014/main" xmlns="" id="{C5C403EE-515C-4FF5-9778-90E68BE109B9}"/>
               </a:ext>
             </a:extLst>
           </p:cNvPr>
@@ -9165,7 +9191,7 @@
           <a:graphicData uri="http://schemas.openxmlformats.org/presentationml/2006/ole">
             <mc:AlternateContent xmlns:mc="http://schemas.openxmlformats.org/markup-compatibility/2006">
               <mc:Choice xmlns:v="urn:schemas-microsoft-com:vml" Requires="v">
-                <p:oleObj spid="_x0000_s2050" r:id="rId5" imgW="0" imgH="0" progId="TCLayout.ActiveDocument.1">
+                <p:oleObj spid="_x0000_s2053" r:id="rId5" imgW="0" imgH="0" progId="TCLayout.ActiveDocument.1">
                   <p:embed/>
                 </p:oleObj>
               </mc:Choice>
@@ -9271,7 +9297,7 @@
           <p:cNvPr id="7" name="TextBox 6">
             <a:extLst>
               <a:ext uri="{FF2B5EF4-FFF2-40B4-BE49-F238E27FC236}">
-                <a16:creationId xmlns:a16="http://schemas.microsoft.com/office/drawing/2014/main" id="{59D6BA0D-75DA-411C-AE80-6B1C75B5F712}"/>
+                <a16:creationId xmlns:a16="http://schemas.microsoft.com/office/drawing/2014/main" xmlns="" id="{59D6BA0D-75DA-411C-AE80-6B1C75B5F712}"/>
               </a:ext>
             </a:extLst>
           </p:cNvPr>
@@ -9310,7 +9336,7 @@
           <p:cNvPr id="5" name="TextBox 4">
             <a:extLst>
               <a:ext uri="{FF2B5EF4-FFF2-40B4-BE49-F238E27FC236}">
-                <a16:creationId xmlns:a16="http://schemas.microsoft.com/office/drawing/2014/main" id="{D4726C2B-DC37-47C3-8C2B-30F56E0AFE99}"/>
+                <a16:creationId xmlns:a16="http://schemas.microsoft.com/office/drawing/2014/main" xmlns="" id="{D4726C2B-DC37-47C3-8C2B-30F56E0AFE99}"/>
               </a:ext>
             </a:extLst>
           </p:cNvPr>
@@ -9426,7 +9452,7 @@
           <p:cNvPr id="6" name="TextBox 5">
             <a:extLst>
               <a:ext uri="{FF2B5EF4-FFF2-40B4-BE49-F238E27FC236}">
-                <a16:creationId xmlns:a16="http://schemas.microsoft.com/office/drawing/2014/main" id="{0C7F0FDA-5F46-41BD-BF0F-A903C866FD37}"/>
+                <a16:creationId xmlns:a16="http://schemas.microsoft.com/office/drawing/2014/main" xmlns="" id="{0C7F0FDA-5F46-41BD-BF0F-A903C866FD37}"/>
               </a:ext>
             </a:extLst>
           </p:cNvPr>
@@ -9634,7 +9660,7 @@
           <a:graphicData uri="http://schemas.openxmlformats.org/presentationml/2006/ole">
             <mc:AlternateContent xmlns:mc="http://schemas.openxmlformats.org/markup-compatibility/2006">
               <mc:Choice xmlns:v="urn:schemas-microsoft-com:vml" Requires="v">
-                <p:oleObj spid="_x0000_s19458" r:id="rId5" imgW="0" imgH="0" progId="TCLayout.ActiveDocument.1">
+                <p:oleObj spid="_x0000_s19461" r:id="rId5" imgW="0" imgH="0" progId="TCLayout.ActiveDocument.1">
                   <p:embed/>
                 </p:oleObj>
               </mc:Choice>
@@ -9706,7 +9732,7 @@
           <p:cNvPr id="8" name="Title 40">
             <a:extLst>
               <a:ext uri="{FF2B5EF4-FFF2-40B4-BE49-F238E27FC236}">
-                <a16:creationId xmlns:a16="http://schemas.microsoft.com/office/drawing/2014/main" id="{6D65D641-D69D-4168-BB7D-AD3F200877E3}"/>
+                <a16:creationId xmlns:a16="http://schemas.microsoft.com/office/drawing/2014/main" xmlns="" id="{6D65D641-D69D-4168-BB7D-AD3F200877E3}"/>
               </a:ext>
             </a:extLst>
           </p:cNvPr>
@@ -9746,7 +9772,7 @@
           <p:cNvPr id="3" name="Picture 2">
             <a:extLst>
               <a:ext uri="{FF2B5EF4-FFF2-40B4-BE49-F238E27FC236}">
-                <a16:creationId xmlns:a16="http://schemas.microsoft.com/office/drawing/2014/main" id="{B510CD78-C58F-4733-B0DD-F0874059F617}"/>
+                <a16:creationId xmlns:a16="http://schemas.microsoft.com/office/drawing/2014/main" xmlns="" id="{B510CD78-C58F-4733-B0DD-F0874059F617}"/>
               </a:ext>
             </a:extLst>
           </p:cNvPr>
@@ -9782,7 +9808,7 @@
           <p:cNvPr id="4" name="TextBox 3">
             <a:extLst>
               <a:ext uri="{FF2B5EF4-FFF2-40B4-BE49-F238E27FC236}">
-                <a16:creationId xmlns:a16="http://schemas.microsoft.com/office/drawing/2014/main" id="{E35C50F2-4743-41B2-9AB5-CE9F40985982}"/>
+                <a16:creationId xmlns:a16="http://schemas.microsoft.com/office/drawing/2014/main" xmlns="" id="{E35C50F2-4743-41B2-9AB5-CE9F40985982}"/>
               </a:ext>
             </a:extLst>
           </p:cNvPr>
@@ -9866,7 +9892,7 @@
           <a:graphicData uri="http://schemas.openxmlformats.org/presentationml/2006/ole">
             <mc:AlternateContent xmlns:mc="http://schemas.openxmlformats.org/markup-compatibility/2006">
               <mc:Choice xmlns:v="urn:schemas-microsoft-com:vml" Requires="v">
-                <p:oleObj spid="_x0000_s20482" r:id="rId5" imgW="0" imgH="0" progId="TCLayout.ActiveDocument.1">
+                <p:oleObj spid="_x0000_s20485" r:id="rId5" imgW="0" imgH="0" progId="TCLayout.ActiveDocument.1">
                   <p:embed/>
                 </p:oleObj>
               </mc:Choice>
@@ -9938,7 +9964,7 @@
           <p:cNvPr id="8" name="Title 40">
             <a:extLst>
               <a:ext uri="{FF2B5EF4-FFF2-40B4-BE49-F238E27FC236}">
-                <a16:creationId xmlns:a16="http://schemas.microsoft.com/office/drawing/2014/main" id="{6D65D641-D69D-4168-BB7D-AD3F200877E3}"/>
+                <a16:creationId xmlns:a16="http://schemas.microsoft.com/office/drawing/2014/main" xmlns="" id="{6D65D641-D69D-4168-BB7D-AD3F200877E3}"/>
               </a:ext>
             </a:extLst>
           </p:cNvPr>
@@ -9978,7 +10004,7 @@
           <p:cNvPr id="3" name="Picture 2">
             <a:extLst>
               <a:ext uri="{FF2B5EF4-FFF2-40B4-BE49-F238E27FC236}">
-                <a16:creationId xmlns:a16="http://schemas.microsoft.com/office/drawing/2014/main" id="{0FB252C2-8E0F-4E4E-AF3D-AD81519AC032}"/>
+                <a16:creationId xmlns:a16="http://schemas.microsoft.com/office/drawing/2014/main" xmlns="" id="{0FB252C2-8E0F-4E4E-AF3D-AD81519AC032}"/>
               </a:ext>
             </a:extLst>
           </p:cNvPr>
@@ -10007,7 +10033,7 @@
           <p:cNvPr id="4" name="TextBox 3">
             <a:extLst>
               <a:ext uri="{FF2B5EF4-FFF2-40B4-BE49-F238E27FC236}">
-                <a16:creationId xmlns:a16="http://schemas.microsoft.com/office/drawing/2014/main" id="{55A35CDF-AA72-4476-9932-1916784F16A0}"/>
+                <a16:creationId xmlns:a16="http://schemas.microsoft.com/office/drawing/2014/main" xmlns="" id="{55A35CDF-AA72-4476-9932-1916784F16A0}"/>
               </a:ext>
             </a:extLst>
           </p:cNvPr>
@@ -10091,7 +10117,7 @@
           <a:graphicData uri="http://schemas.openxmlformats.org/presentationml/2006/ole">
             <mc:AlternateContent xmlns:mc="http://schemas.openxmlformats.org/markup-compatibility/2006">
               <mc:Choice xmlns:v="urn:schemas-microsoft-com:vml" Requires="v">
-                <p:oleObj spid="_x0000_s21506" r:id="rId5" imgW="0" imgH="0" progId="TCLayout.ActiveDocument.1">
+                <p:oleObj spid="_x0000_s21509" r:id="rId5" imgW="0" imgH="0" progId="TCLayout.ActiveDocument.1">
                   <p:embed/>
                 </p:oleObj>
               </mc:Choice>
@@ -10163,7 +10189,7 @@
           <p:cNvPr id="8" name="Title 40">
             <a:extLst>
               <a:ext uri="{FF2B5EF4-FFF2-40B4-BE49-F238E27FC236}">
-                <a16:creationId xmlns:a16="http://schemas.microsoft.com/office/drawing/2014/main" id="{6D65D641-D69D-4168-BB7D-AD3F200877E3}"/>
+                <a16:creationId xmlns:a16="http://schemas.microsoft.com/office/drawing/2014/main" xmlns="" id="{6D65D641-D69D-4168-BB7D-AD3F200877E3}"/>
               </a:ext>
             </a:extLst>
           </p:cNvPr>
@@ -10203,7 +10229,7 @@
           <p:cNvPr id="4" name="TextBox 3">
             <a:extLst>
               <a:ext uri="{FF2B5EF4-FFF2-40B4-BE49-F238E27FC236}">
-                <a16:creationId xmlns:a16="http://schemas.microsoft.com/office/drawing/2014/main" id="{55A35CDF-AA72-4476-9932-1916784F16A0}"/>
+                <a16:creationId xmlns:a16="http://schemas.microsoft.com/office/drawing/2014/main" xmlns="" id="{55A35CDF-AA72-4476-9932-1916784F16A0}"/>
               </a:ext>
             </a:extLst>
           </p:cNvPr>
@@ -10239,7 +10265,7 @@
           <p:cNvPr id="2" name="Picture 1">
             <a:extLst>
               <a:ext uri="{FF2B5EF4-FFF2-40B4-BE49-F238E27FC236}">
-                <a16:creationId xmlns:a16="http://schemas.microsoft.com/office/drawing/2014/main" id="{709B7CA3-1C2B-4CBD-A4DC-E0FFDD1797D5}"/>
+                <a16:creationId xmlns:a16="http://schemas.microsoft.com/office/drawing/2014/main" xmlns="" id="{709B7CA3-1C2B-4CBD-A4DC-E0FFDD1797D5}"/>
               </a:ext>
             </a:extLst>
           </p:cNvPr>
@@ -10269,7 +10295,7 @@
           <p:cNvPr id="5" name="Oval 4">
             <a:extLst>
               <a:ext uri="{FF2B5EF4-FFF2-40B4-BE49-F238E27FC236}">
-                <a16:creationId xmlns:a16="http://schemas.microsoft.com/office/drawing/2014/main" id="{DCF6EEDF-92EF-487E-B22E-41DFF87D8D6C}"/>
+                <a16:creationId xmlns:a16="http://schemas.microsoft.com/office/drawing/2014/main" xmlns="" id="{DCF6EEDF-92EF-487E-B22E-41DFF87D8D6C}"/>
               </a:ext>
             </a:extLst>
           </p:cNvPr>
@@ -10321,7 +10347,7 @@
           <p:cNvPr id="6" name="Picture 5">
             <a:extLst>
               <a:ext uri="{FF2B5EF4-FFF2-40B4-BE49-F238E27FC236}">
-                <a16:creationId xmlns:a16="http://schemas.microsoft.com/office/drawing/2014/main" id="{38A4E0B2-C99F-4965-AC9B-E021F3FAC04F}"/>
+                <a16:creationId xmlns:a16="http://schemas.microsoft.com/office/drawing/2014/main" xmlns="" id="{38A4E0B2-C99F-4965-AC9B-E021F3FAC04F}"/>
               </a:ext>
             </a:extLst>
           </p:cNvPr>
@@ -10351,7 +10377,7 @@
           <p:cNvPr id="9" name="Oval 8">
             <a:extLst>
               <a:ext uri="{FF2B5EF4-FFF2-40B4-BE49-F238E27FC236}">
-                <a16:creationId xmlns:a16="http://schemas.microsoft.com/office/drawing/2014/main" id="{DA85EFC5-6758-4672-8D66-D8CAD1F9EAEA}"/>
+                <a16:creationId xmlns:a16="http://schemas.microsoft.com/office/drawing/2014/main" xmlns="" id="{DA85EFC5-6758-4672-8D66-D8CAD1F9EAEA}"/>
               </a:ext>
             </a:extLst>
           </p:cNvPr>
@@ -10403,7 +10429,7 @@
           <p:cNvPr id="10" name="TextBox 9">
             <a:extLst>
               <a:ext uri="{FF2B5EF4-FFF2-40B4-BE49-F238E27FC236}">
-                <a16:creationId xmlns:a16="http://schemas.microsoft.com/office/drawing/2014/main" id="{1C44E4A5-08FF-4A36-B0A0-30A45F59F7D3}"/>
+                <a16:creationId xmlns:a16="http://schemas.microsoft.com/office/drawing/2014/main" xmlns="" id="{1C44E4A5-08FF-4A36-B0A0-30A45F59F7D3}"/>
               </a:ext>
             </a:extLst>
           </p:cNvPr>
@@ -10484,7 +10510,7 @@
           <a:graphicData uri="http://schemas.openxmlformats.org/presentationml/2006/ole">
             <mc:AlternateContent xmlns:mc="http://schemas.openxmlformats.org/markup-compatibility/2006">
               <mc:Choice xmlns:v="urn:schemas-microsoft-com:vml" Requires="v">
-                <p:oleObj spid="_x0000_s22530" r:id="rId5" imgW="0" imgH="0" progId="TCLayout.ActiveDocument.1">
+                <p:oleObj spid="_x0000_s22535" r:id="rId5" imgW="0" imgH="0" progId="TCLayout.ActiveDocument.1">
                   <p:embed/>
                 </p:oleObj>
               </mc:Choice>
@@ -10556,7 +10582,7 @@
           <p:cNvPr id="8" name="Title 40">
             <a:extLst>
               <a:ext uri="{FF2B5EF4-FFF2-40B4-BE49-F238E27FC236}">
-                <a16:creationId xmlns:a16="http://schemas.microsoft.com/office/drawing/2014/main" id="{6D65D641-D69D-4168-BB7D-AD3F200877E3}"/>
+                <a16:creationId xmlns:a16="http://schemas.microsoft.com/office/drawing/2014/main" xmlns="" id="{6D65D641-D69D-4168-BB7D-AD3F200877E3}"/>
               </a:ext>
             </a:extLst>
           </p:cNvPr>
@@ -10591,6 +10617,165 @@
           </a:p>
         </p:txBody>
       </p:sp>
+      <p:sp>
+        <p:nvSpPr>
+          <p:cNvPr id="4" name="TextBox 3">
+            <a:extLst>
+              <a:ext uri="{FF2B5EF4-FFF2-40B4-BE49-F238E27FC236}">
+                <a16:creationId xmlns:a16="http://schemas.microsoft.com/office/drawing/2014/main" xmlns="" id="{59D6BA0D-75DA-411C-AE80-6B1C75B5F712}"/>
+              </a:ext>
+            </a:extLst>
+          </p:cNvPr>
+          <p:cNvSpPr txBox="1"/>
+          <p:nvPr/>
+        </p:nvSpPr>
+        <p:spPr>
+          <a:xfrm>
+            <a:off x="533400" y="960438"/>
+            <a:ext cx="7772400" cy="2585323"/>
+          </a:xfrm>
+          <a:prstGeom prst="rect">
+            <a:avLst/>
+          </a:prstGeom>
+          <a:noFill/>
+        </p:spPr>
+        <p:txBody>
+          <a:bodyPr wrap="square" rtlCol="0">
+            <a:spAutoFit/>
+          </a:bodyPr>
+          <a:lstStyle/>
+          <a:p>
+            <a:r>
+              <a:rPr lang="en-US" b="1" dirty="0" smtClean="0">
+                <a:solidFill>
+                  <a:srgbClr val="000066"/>
+                </a:solidFill>
+              </a:rPr>
+              <a:t>The positive ROI is obviously a good thing, but here is a different way to look at the results that may be comforting for the risk-averse:</a:t>
+            </a:r>
+            <a:endParaRPr lang="en-US" b="1" i="1" dirty="0" smtClean="0">
+              <a:solidFill>
+                <a:srgbClr val="000066"/>
+              </a:solidFill>
+            </a:endParaRPr>
+          </a:p>
+          <a:p>
+            <a:endParaRPr lang="en-US" b="1" i="1" dirty="0">
+              <a:solidFill>
+                <a:srgbClr val="000066"/>
+              </a:solidFill>
+            </a:endParaRPr>
+          </a:p>
+          <a:p>
+            <a:pPr marL="285750" indent="-285750">
+              <a:buFont typeface="Arial" charset="0"/>
+              <a:buChar char="•"/>
+            </a:pPr>
+            <a:r>
+              <a:rPr lang="en-US" b="1" i="1" dirty="0" smtClean="0">
+                <a:solidFill>
+                  <a:srgbClr val="000066"/>
+                </a:solidFill>
+              </a:rPr>
+              <a:t>A 30% ROI or better is more likely than losing any money whatsoever</a:t>
+            </a:r>
+          </a:p>
+          <a:p>
+            <a:pPr marL="285750" indent="-285750">
+              <a:buFont typeface="Arial" charset="0"/>
+              <a:buChar char="•"/>
+            </a:pPr>
+            <a:r>
+              <a:rPr lang="en-US" b="1" i="1" dirty="0" smtClean="0">
+                <a:solidFill>
+                  <a:srgbClr val="000066"/>
+                </a:solidFill>
+              </a:rPr>
+              <a:t>A 40% increase is more likely than a 10% drop</a:t>
+            </a:r>
+          </a:p>
+          <a:p>
+            <a:pPr marL="285750" indent="-285750">
+              <a:buFont typeface="Arial" charset="0"/>
+              <a:buChar char="•"/>
+            </a:pPr>
+            <a:r>
+              <a:rPr lang="en-US" b="1" i="1" dirty="0" smtClean="0">
+                <a:solidFill>
+                  <a:srgbClr val="000066"/>
+                </a:solidFill>
+              </a:rPr>
+              <a:t>A 60% ROI is more likely than a 25% decline</a:t>
+            </a:r>
+          </a:p>
+          <a:p>
+            <a:pPr marL="285750" indent="-285750">
+              <a:buFont typeface="Arial" charset="0"/>
+              <a:buChar char="•"/>
+            </a:pPr>
+            <a:r>
+              <a:rPr lang="en-US" b="1" i="1" dirty="0" smtClean="0">
+                <a:solidFill>
+                  <a:srgbClr val="000066"/>
+                </a:solidFill>
+              </a:rPr>
+              <a:t>A 140% return more likely than a 50% drop in value</a:t>
+            </a:r>
+          </a:p>
+          <a:p>
+            <a:pPr marL="285750" indent="-285750">
+              <a:buFontTx/>
+              <a:buChar char="-"/>
+            </a:pPr>
+            <a:endParaRPr lang="en-US" b="1" i="1" dirty="0" smtClean="0">
+              <a:solidFill>
+                <a:srgbClr val="000066"/>
+              </a:solidFill>
+            </a:endParaRPr>
+          </a:p>
+          <a:p>
+            <a:pPr marL="285750" indent="-285750">
+              <a:buFont typeface="Arial" panose="020B0604020202020204" pitchFamily="34" charset="0"/>
+              <a:buChar char="•"/>
+            </a:pPr>
+            <a:endParaRPr lang="en-US" b="1" i="1" dirty="0">
+              <a:solidFill>
+                <a:srgbClr val="000066"/>
+              </a:solidFill>
+            </a:endParaRPr>
+          </a:p>
+        </p:txBody>
+      </p:sp>
+      <p:pic>
+        <p:nvPicPr>
+          <p:cNvPr id="3" name="Picture 2"/>
+          <p:cNvPicPr>
+            <a:picLocks noChangeAspect="1"/>
+          </p:cNvPicPr>
+          <p:nvPr/>
+        </p:nvPicPr>
+        <p:blipFill>
+          <a:blip r:embed="rId6">
+            <a:extLst>
+              <a:ext uri="{28A0092B-C50C-407E-A947-70E740481C1C}">
+                <a14:useLocalDpi xmlns:a14="http://schemas.microsoft.com/office/drawing/2010/main" val="0"/>
+              </a:ext>
+            </a:extLst>
+          </a:blip>
+          <a:stretch>
+            <a:fillRect/>
+          </a:stretch>
+        </p:blipFill>
+        <p:spPr>
+          <a:xfrm>
+            <a:off x="1860550" y="3104474"/>
+            <a:ext cx="5118100" cy="3721100"/>
+          </a:xfrm>
+          <a:prstGeom prst="rect">
+            <a:avLst/>
+          </a:prstGeom>
+        </p:spPr>
+      </p:pic>
     </p:spTree>
     <p:extLst>
       <p:ext uri="{BB962C8B-B14F-4D97-AF65-F5344CB8AC3E}">
@@ -10601,6 +10786,84 @@
   <p:clrMapOvr>
     <a:masterClrMapping/>
   </p:clrMapOvr>
+  <p:timing>
+    <p:tnLst>
+      <p:par>
+        <p:cTn id="1" dur="indefinite" restart="never" nodeType="tmRoot">
+          <p:childTnLst>
+            <p:seq concurrent="1" nextAc="seek">
+              <p:cTn id="2" dur="indefinite" nodeType="mainSeq">
+                <p:childTnLst>
+                  <p:par>
+                    <p:cTn id="3" fill="hold">
+                      <p:stCondLst>
+                        <p:cond delay="indefinite"/>
+                      </p:stCondLst>
+                      <p:childTnLst>
+                        <p:par>
+                          <p:cTn id="4" fill="hold">
+                            <p:stCondLst>
+                              <p:cond delay="0"/>
+                            </p:stCondLst>
+                            <p:childTnLst>
+                              <p:par>
+                                <p:cTn id="5" presetID="1" presetClass="entr" presetSubtype="0" fill="hold" grpId="0" nodeType="clickEffect">
+                                  <p:stCondLst>
+                                    <p:cond delay="0"/>
+                                  </p:stCondLst>
+                                  <p:childTnLst>
+                                    <p:set>
+                                      <p:cBhvr>
+                                        <p:cTn id="6" dur="1" fill="hold">
+                                          <p:stCondLst>
+                                            <p:cond delay="0"/>
+                                          </p:stCondLst>
+                                        </p:cTn>
+                                        <p:tgtEl>
+                                          <p:spTgt spid="4"/>
+                                        </p:tgtEl>
+                                        <p:attrNameLst>
+                                          <p:attrName>style.visibility</p:attrName>
+                                        </p:attrNameLst>
+                                      </p:cBhvr>
+                                      <p:to>
+                                        <p:strVal val="visible"/>
+                                      </p:to>
+                                    </p:set>
+                                  </p:childTnLst>
+                                </p:cTn>
+                              </p:par>
+                            </p:childTnLst>
+                          </p:cTn>
+                        </p:par>
+                      </p:childTnLst>
+                    </p:cTn>
+                  </p:par>
+                </p:childTnLst>
+              </p:cTn>
+              <p:prevCondLst>
+                <p:cond evt="onPrev" delay="0">
+                  <p:tgtEl>
+                    <p:sldTgt/>
+                  </p:tgtEl>
+                </p:cond>
+              </p:prevCondLst>
+              <p:nextCondLst>
+                <p:cond evt="onNext" delay="0">
+                  <p:tgtEl>
+                    <p:sldTgt/>
+                  </p:tgtEl>
+                </p:cond>
+              </p:nextCondLst>
+            </p:seq>
+          </p:childTnLst>
+        </p:cTn>
+      </p:par>
+    </p:tnLst>
+    <p:bldLst>
+      <p:bldP spid="4" grpId="0"/>
+    </p:bldLst>
+  </p:timing>
 </p:sld>
 </file>
 
@@ -10641,7 +10904,7 @@
           <a:graphicData uri="http://schemas.openxmlformats.org/presentationml/2006/ole">
             <mc:AlternateContent xmlns:mc="http://schemas.openxmlformats.org/markup-compatibility/2006">
               <mc:Choice xmlns:v="urn:schemas-microsoft-com:vml" Requires="v">
-                <p:oleObj spid="_x0000_s23554" r:id="rId5" imgW="0" imgH="0" progId="TCLayout.ActiveDocument.1">
+                <p:oleObj spid="_x0000_s23561" r:id="rId5" imgW="0" imgH="0" progId="TCLayout.ActiveDocument.1">
                   <p:embed/>
                 </p:oleObj>
               </mc:Choice>
@@ -10713,7 +10976,7 @@
           <p:cNvPr id="8" name="Title 40">
             <a:extLst>
               <a:ext uri="{FF2B5EF4-FFF2-40B4-BE49-F238E27FC236}">
-                <a16:creationId xmlns:a16="http://schemas.microsoft.com/office/drawing/2014/main" id="{6D65D641-D69D-4168-BB7D-AD3F200877E3}"/>
+                <a16:creationId xmlns:a16="http://schemas.microsoft.com/office/drawing/2014/main" xmlns="" id="{6D65D641-D69D-4168-BB7D-AD3F200877E3}"/>
               </a:ext>
             </a:extLst>
           </p:cNvPr>
@@ -10745,6 +11008,249 @@
               </a:rPr>
               <a:t>Findings</a:t>
             </a:r>
+          </a:p>
+        </p:txBody>
+      </p:sp>
+      <p:sp>
+        <p:nvSpPr>
+          <p:cNvPr id="4" name="TextBox 3">
+            <a:extLst>
+              <a:ext uri="{FF2B5EF4-FFF2-40B4-BE49-F238E27FC236}">
+                <a16:creationId xmlns:a16="http://schemas.microsoft.com/office/drawing/2014/main" xmlns="" id="{59D6BA0D-75DA-411C-AE80-6B1C75B5F712}"/>
+              </a:ext>
+            </a:extLst>
+          </p:cNvPr>
+          <p:cNvSpPr txBox="1"/>
+          <p:nvPr/>
+        </p:nvSpPr>
+        <p:spPr>
+          <a:xfrm>
+            <a:off x="533400" y="1143923"/>
+            <a:ext cx="7772400" cy="4247317"/>
+          </a:xfrm>
+          <a:prstGeom prst="rect">
+            <a:avLst/>
+          </a:prstGeom>
+          <a:noFill/>
+        </p:spPr>
+        <p:txBody>
+          <a:bodyPr wrap="square" rtlCol="0">
+            <a:spAutoFit/>
+          </a:bodyPr>
+          <a:lstStyle/>
+          <a:p>
+            <a:r>
+              <a:rPr lang="en-US" b="1" dirty="0" smtClean="0">
+                <a:solidFill>
+                  <a:srgbClr val="000066"/>
+                </a:solidFill>
+              </a:rPr>
+              <a:t>Positive results:</a:t>
+            </a:r>
+            <a:endParaRPr lang="en-US" b="1" dirty="0">
+              <a:solidFill>
+                <a:srgbClr val="000066"/>
+              </a:solidFill>
+            </a:endParaRPr>
+          </a:p>
+          <a:p>
+            <a:pPr marL="285750" indent="-285750">
+              <a:buFont typeface="Arial" panose="020B0604020202020204" pitchFamily="34" charset="0"/>
+              <a:buChar char="•"/>
+            </a:pPr>
+            <a:endParaRPr lang="en-US" b="1" i="1" dirty="0">
+              <a:solidFill>
+                <a:srgbClr val="000066"/>
+              </a:solidFill>
+            </a:endParaRPr>
+          </a:p>
+          <a:p>
+            <a:pPr marL="285750" indent="-285750">
+              <a:buFont typeface="Arial" panose="020B0604020202020204" pitchFamily="34" charset="0"/>
+              <a:buChar char="•"/>
+            </a:pPr>
+            <a:r>
+              <a:rPr lang="en-US" b="1" i="1" dirty="0" smtClean="0">
+                <a:solidFill>
+                  <a:srgbClr val="000066"/>
+                </a:solidFill>
+              </a:rPr>
+              <a:t>Almost all of the stocks bounce back (93.2%) within 6 months</a:t>
+            </a:r>
+            <a:endParaRPr lang="en-US" b="1" i="1" dirty="0">
+              <a:solidFill>
+                <a:srgbClr val="000066"/>
+              </a:solidFill>
+            </a:endParaRPr>
+          </a:p>
+          <a:p>
+            <a:pPr marL="285750" indent="-285750">
+              <a:buFont typeface="Arial" panose="020B0604020202020204" pitchFamily="34" charset="0"/>
+              <a:buChar char="•"/>
+            </a:pPr>
+            <a:r>
+              <a:rPr lang="en-US" b="1" i="1" dirty="0" smtClean="0">
+                <a:solidFill>
+                  <a:srgbClr val="000066"/>
+                </a:solidFill>
+              </a:rPr>
+              <a:t>A majority of those bounce backs happen within a 3-week period</a:t>
+            </a:r>
+            <a:endParaRPr lang="en-US" b="1" i="1" dirty="0">
+              <a:solidFill>
+                <a:srgbClr val="000066"/>
+              </a:solidFill>
+            </a:endParaRPr>
+          </a:p>
+          <a:p>
+            <a:pPr marL="285750" indent="-285750">
+              <a:buFont typeface="Arial" panose="020B0604020202020204" pitchFamily="34" charset="0"/>
+              <a:buChar char="•"/>
+            </a:pPr>
+            <a:r>
+              <a:rPr lang="en-US" b="1" i="1" dirty="0" smtClean="0">
+                <a:solidFill>
+                  <a:srgbClr val="000066"/>
+                </a:solidFill>
+              </a:rPr>
+              <a:t>This subset returns is our strongest over the next 6 months</a:t>
+            </a:r>
+          </a:p>
+          <a:p>
+            <a:pPr marL="285750" indent="-285750">
+              <a:buFont typeface="Arial" panose="020B0604020202020204" pitchFamily="34" charset="0"/>
+              <a:buChar char="•"/>
+            </a:pPr>
+            <a:r>
+              <a:rPr lang="en-US" b="1" i="1" dirty="0" smtClean="0">
+                <a:solidFill>
+                  <a:srgbClr val="000066"/>
+                </a:solidFill>
+              </a:rPr>
+              <a:t>Approximately 90% of the bounce backs happen within 10 weeks</a:t>
+            </a:r>
+          </a:p>
+          <a:p>
+            <a:pPr marL="285750" indent="-285750">
+              <a:buFont typeface="Arial" panose="020B0604020202020204" pitchFamily="34" charset="0"/>
+              <a:buChar char="•"/>
+            </a:pPr>
+            <a:r>
+              <a:rPr lang="en-US" b="1" i="1" dirty="0" smtClean="0">
+                <a:solidFill>
+                  <a:srgbClr val="000066"/>
+                </a:solidFill>
+              </a:rPr>
+              <a:t>This is our threshold for being a worthy buying opportunity</a:t>
+            </a:r>
+            <a:endParaRPr lang="en-US" b="1" dirty="0" smtClean="0">
+              <a:solidFill>
+                <a:srgbClr val="000066"/>
+              </a:solidFill>
+            </a:endParaRPr>
+          </a:p>
+          <a:p>
+            <a:endParaRPr lang="en-US" b="1" dirty="0" smtClean="0">
+              <a:solidFill>
+                <a:srgbClr val="000066"/>
+              </a:solidFill>
+            </a:endParaRPr>
+          </a:p>
+          <a:p>
+            <a:endParaRPr lang="en-US" b="1" dirty="0" smtClean="0">
+              <a:solidFill>
+                <a:srgbClr val="000066"/>
+              </a:solidFill>
+            </a:endParaRPr>
+          </a:p>
+          <a:p>
+            <a:r>
+              <a:rPr lang="en-US" b="1" dirty="0" smtClean="0">
+                <a:solidFill>
+                  <a:srgbClr val="000066"/>
+                </a:solidFill>
+              </a:rPr>
+              <a:t>Surprising non-factors:</a:t>
+            </a:r>
+            <a:endParaRPr lang="en-US" b="1" dirty="0">
+              <a:solidFill>
+                <a:srgbClr val="000066"/>
+              </a:solidFill>
+            </a:endParaRPr>
+          </a:p>
+          <a:p>
+            <a:pPr marL="285750" indent="-285750">
+              <a:buFont typeface="Arial" panose="020B0604020202020204" pitchFamily="34" charset="0"/>
+              <a:buChar char="•"/>
+            </a:pPr>
+            <a:endParaRPr lang="en-US" b="1" i="1" dirty="0">
+              <a:solidFill>
+                <a:srgbClr val="000066"/>
+              </a:solidFill>
+            </a:endParaRPr>
+          </a:p>
+          <a:p>
+            <a:pPr marL="285750" indent="-285750">
+              <a:buFont typeface="Arial" panose="020B0604020202020204" pitchFamily="34" charset="0"/>
+              <a:buChar char="•"/>
+            </a:pPr>
+            <a:r>
+              <a:rPr lang="en-US" b="1" i="1" dirty="0" smtClean="0">
+                <a:solidFill>
+                  <a:srgbClr val="000066"/>
+                </a:solidFill>
+              </a:rPr>
+              <a:t>Length of decline (time)</a:t>
+            </a:r>
+            <a:endParaRPr lang="en-US" b="1" i="1" dirty="0">
+              <a:solidFill>
+                <a:srgbClr val="000066"/>
+              </a:solidFill>
+            </a:endParaRPr>
+          </a:p>
+          <a:p>
+            <a:pPr marL="285750" indent="-285750">
+              <a:buFont typeface="Arial" panose="020B0604020202020204" pitchFamily="34" charset="0"/>
+              <a:buChar char="•"/>
+            </a:pPr>
+            <a:r>
+              <a:rPr lang="en-US" b="1" i="1" dirty="0" smtClean="0">
+                <a:solidFill>
+                  <a:srgbClr val="000066"/>
+                </a:solidFill>
+              </a:rPr>
+              <a:t>Magnitude of decline (% of price)</a:t>
+            </a:r>
+            <a:endParaRPr lang="en-US" b="1" i="1" dirty="0">
+              <a:solidFill>
+                <a:srgbClr val="000066"/>
+              </a:solidFill>
+            </a:endParaRPr>
+          </a:p>
+          <a:p>
+            <a:pPr marL="285750" indent="-285750">
+              <a:buFont typeface="Arial" panose="020B0604020202020204" pitchFamily="34" charset="0"/>
+              <a:buChar char="•"/>
+            </a:pPr>
+            <a:r>
+              <a:rPr lang="en-US" b="1" i="1" dirty="0" smtClean="0">
+                <a:solidFill>
+                  <a:srgbClr val="000066"/>
+                </a:solidFill>
+              </a:rPr>
+              <a:t>Original stock price</a:t>
+            </a:r>
+          </a:p>
+          <a:p>
+            <a:pPr marL="285750" indent="-285750">
+              <a:buFont typeface="Arial" panose="020B0604020202020204" pitchFamily="34" charset="0"/>
+              <a:buChar char="•"/>
+            </a:pPr>
+            <a:endParaRPr lang="en-US" b="1" i="1" dirty="0">
+              <a:solidFill>
+                <a:srgbClr val="000066"/>
+              </a:solidFill>
+            </a:endParaRPr>
           </a:p>
         </p:txBody>
       </p:sp>
@@ -10758,6 +11264,84 @@
   <p:clrMapOvr>
     <a:masterClrMapping/>
   </p:clrMapOvr>
+  <p:timing>
+    <p:tnLst>
+      <p:par>
+        <p:cTn id="1" dur="indefinite" restart="never" nodeType="tmRoot">
+          <p:childTnLst>
+            <p:seq concurrent="1" nextAc="seek">
+              <p:cTn id="2" dur="indefinite" nodeType="mainSeq">
+                <p:childTnLst>
+                  <p:par>
+                    <p:cTn id="3" fill="hold">
+                      <p:stCondLst>
+                        <p:cond delay="indefinite"/>
+                      </p:stCondLst>
+                      <p:childTnLst>
+                        <p:par>
+                          <p:cTn id="4" fill="hold">
+                            <p:stCondLst>
+                              <p:cond delay="0"/>
+                            </p:stCondLst>
+                            <p:childTnLst>
+                              <p:par>
+                                <p:cTn id="5" presetID="1" presetClass="entr" presetSubtype="0" fill="hold" grpId="0" nodeType="clickEffect">
+                                  <p:stCondLst>
+                                    <p:cond delay="0"/>
+                                  </p:stCondLst>
+                                  <p:childTnLst>
+                                    <p:set>
+                                      <p:cBhvr>
+                                        <p:cTn id="6" dur="1" fill="hold">
+                                          <p:stCondLst>
+                                            <p:cond delay="0"/>
+                                          </p:stCondLst>
+                                        </p:cTn>
+                                        <p:tgtEl>
+                                          <p:spTgt spid="4"/>
+                                        </p:tgtEl>
+                                        <p:attrNameLst>
+                                          <p:attrName>style.visibility</p:attrName>
+                                        </p:attrNameLst>
+                                      </p:cBhvr>
+                                      <p:to>
+                                        <p:strVal val="visible"/>
+                                      </p:to>
+                                    </p:set>
+                                  </p:childTnLst>
+                                </p:cTn>
+                              </p:par>
+                            </p:childTnLst>
+                          </p:cTn>
+                        </p:par>
+                      </p:childTnLst>
+                    </p:cTn>
+                  </p:par>
+                </p:childTnLst>
+              </p:cTn>
+              <p:prevCondLst>
+                <p:cond evt="onPrev" delay="0">
+                  <p:tgtEl>
+                    <p:sldTgt/>
+                  </p:tgtEl>
+                </p:cond>
+              </p:prevCondLst>
+              <p:nextCondLst>
+                <p:cond evt="onNext" delay="0">
+                  <p:tgtEl>
+                    <p:sldTgt/>
+                  </p:tgtEl>
+                </p:cond>
+              </p:nextCondLst>
+            </p:seq>
+          </p:childTnLst>
+        </p:cTn>
+      </p:par>
+    </p:tnLst>
+    <p:bldLst>
+      <p:bldP spid="4" grpId="0"/>
+    </p:bldLst>
+  </p:timing>
 </p:sld>
 </file>
 
@@ -10798,7 +11382,7 @@
           <a:graphicData uri="http://schemas.openxmlformats.org/presentationml/2006/ole">
             <mc:AlternateContent xmlns:mc="http://schemas.openxmlformats.org/markup-compatibility/2006">
               <mc:Choice xmlns:v="urn:schemas-microsoft-com:vml" Requires="v">
-                <p:oleObj spid="_x0000_s24578" r:id="rId5" imgW="0" imgH="0" progId="TCLayout.ActiveDocument.1">
+                <p:oleObj spid="_x0000_s24583" r:id="rId5" imgW="0" imgH="0" progId="TCLayout.ActiveDocument.1">
                   <p:embed/>
                 </p:oleObj>
               </mc:Choice>
@@ -10870,7 +11454,7 @@
           <p:cNvPr id="8" name="Title 40">
             <a:extLst>
               <a:ext uri="{FF2B5EF4-FFF2-40B4-BE49-F238E27FC236}">
-                <a16:creationId xmlns:a16="http://schemas.microsoft.com/office/drawing/2014/main" id="{6D65D641-D69D-4168-BB7D-AD3F200877E3}"/>
+                <a16:creationId xmlns:a16="http://schemas.microsoft.com/office/drawing/2014/main" xmlns="" id="{6D65D641-D69D-4168-BB7D-AD3F200877E3}"/>
               </a:ext>
             </a:extLst>
           </p:cNvPr>
@@ -10902,6 +11486,255 @@
               </a:rPr>
               <a:t>Next Steps</a:t>
             </a:r>
+          </a:p>
+        </p:txBody>
+      </p:sp>
+      <p:sp>
+        <p:nvSpPr>
+          <p:cNvPr id="4" name="TextBox 3">
+            <a:extLst>
+              <a:ext uri="{FF2B5EF4-FFF2-40B4-BE49-F238E27FC236}">
+                <a16:creationId xmlns:a16="http://schemas.microsoft.com/office/drawing/2014/main" xmlns="" id="{59D6BA0D-75DA-411C-AE80-6B1C75B5F712}"/>
+              </a:ext>
+            </a:extLst>
+          </p:cNvPr>
+          <p:cNvSpPr txBox="1"/>
+          <p:nvPr/>
+        </p:nvSpPr>
+        <p:spPr>
+          <a:xfrm>
+            <a:off x="533400" y="1143923"/>
+            <a:ext cx="7772400" cy="5078313"/>
+          </a:xfrm>
+          <a:prstGeom prst="rect">
+            <a:avLst/>
+          </a:prstGeom>
+          <a:noFill/>
+        </p:spPr>
+        <p:txBody>
+          <a:bodyPr wrap="square" rtlCol="0">
+            <a:spAutoFit/>
+          </a:bodyPr>
+          <a:lstStyle/>
+          <a:p>
+            <a:r>
+              <a:rPr lang="en-US" b="1" dirty="0" smtClean="0">
+                <a:solidFill>
+                  <a:srgbClr val="000066"/>
+                </a:solidFill>
+              </a:rPr>
+              <a:t>Find out if the severity of the news event influences results</a:t>
+            </a:r>
+            <a:endParaRPr lang="en-US" b="1" dirty="0">
+              <a:solidFill>
+                <a:srgbClr val="000066"/>
+              </a:solidFill>
+            </a:endParaRPr>
+          </a:p>
+          <a:p>
+            <a:endParaRPr lang="en-US" b="1" dirty="0">
+              <a:solidFill>
+                <a:srgbClr val="000066"/>
+              </a:solidFill>
+            </a:endParaRPr>
+          </a:p>
+          <a:p>
+            <a:pPr marL="285750" indent="-285750">
+              <a:buFont typeface="Arial" panose="020B0604020202020204" pitchFamily="34" charset="0"/>
+              <a:buChar char="•"/>
+            </a:pPr>
+            <a:r>
+              <a:rPr lang="en-US" b="1" i="1" dirty="0" smtClean="0">
+                <a:solidFill>
+                  <a:srgbClr val="000066"/>
+                </a:solidFill>
+              </a:rPr>
+              <a:t>Calculate article count &amp; average sentiment during week of major decline</a:t>
+            </a:r>
+            <a:endParaRPr lang="en-US" b="1" i="1" dirty="0">
+              <a:solidFill>
+                <a:srgbClr val="000066"/>
+              </a:solidFill>
+            </a:endParaRPr>
+          </a:p>
+          <a:p>
+            <a:pPr marL="285750" indent="-285750">
+              <a:buFont typeface="Arial" panose="020B0604020202020204" pitchFamily="34" charset="0"/>
+              <a:buChar char="•"/>
+            </a:pPr>
+            <a:r>
+              <a:rPr lang="en-US" b="1" i="1" dirty="0" smtClean="0">
+                <a:solidFill>
+                  <a:srgbClr val="000066"/>
+                </a:solidFill>
+              </a:rPr>
+              <a:t>Recording the type of event based on keyword search</a:t>
+            </a:r>
+          </a:p>
+          <a:p>
+            <a:pPr marL="285750" indent="-285750">
+              <a:buFont typeface="Arial" panose="020B0604020202020204" pitchFamily="34" charset="0"/>
+              <a:buChar char="•"/>
+            </a:pPr>
+            <a:endParaRPr lang="en-US" b="1" i="1" dirty="0" smtClean="0">
+              <a:solidFill>
+                <a:srgbClr val="000066"/>
+              </a:solidFill>
+            </a:endParaRPr>
+          </a:p>
+          <a:p>
+            <a:pPr marL="285750" indent="-285750">
+              <a:buFont typeface="Arial" panose="020B0604020202020204" pitchFamily="34" charset="0"/>
+              <a:buChar char="•"/>
+            </a:pPr>
+            <a:endParaRPr lang="en-US" b="1" i="1" dirty="0" smtClean="0">
+              <a:solidFill>
+                <a:srgbClr val="000066"/>
+              </a:solidFill>
+            </a:endParaRPr>
+          </a:p>
+          <a:p>
+            <a:r>
+              <a:rPr lang="en-US" b="1" dirty="0">
+                <a:solidFill>
+                  <a:srgbClr val="000066"/>
+                </a:solidFill>
+              </a:rPr>
+              <a:t>Further testing</a:t>
+            </a:r>
+          </a:p>
+          <a:p>
+            <a:endParaRPr lang="en-US" b="1" dirty="0">
+              <a:solidFill>
+                <a:srgbClr val="000066"/>
+              </a:solidFill>
+            </a:endParaRPr>
+          </a:p>
+          <a:p>
+            <a:pPr marL="285750" indent="-285750">
+              <a:buFont typeface="Arial" panose="020B0604020202020204" pitchFamily="34" charset="0"/>
+              <a:buChar char="•"/>
+            </a:pPr>
+            <a:r>
+              <a:rPr lang="en-US" b="1" i="1" dirty="0" smtClean="0">
+                <a:solidFill>
+                  <a:srgbClr val="000066"/>
+                </a:solidFill>
+              </a:rPr>
+              <a:t>Test more datasets to further confirm our findings</a:t>
+            </a:r>
+          </a:p>
+          <a:p>
+            <a:pPr marL="285750" indent="-285750">
+              <a:buFont typeface="Arial" panose="020B0604020202020204" pitchFamily="34" charset="0"/>
+              <a:buChar char="•"/>
+            </a:pPr>
+            <a:r>
+              <a:rPr lang="en-US" b="1" i="1" dirty="0" smtClean="0">
+                <a:solidFill>
+                  <a:srgbClr val="000066"/>
+                </a:solidFill>
+              </a:rPr>
+              <a:t>Drill down criteria to find subsets that perform even better than the average</a:t>
+            </a:r>
+          </a:p>
+          <a:p>
+            <a:pPr marL="285750" indent="-285750">
+              <a:buFont typeface="Arial" panose="020B0604020202020204" pitchFamily="34" charset="0"/>
+              <a:buChar char="•"/>
+            </a:pPr>
+            <a:r>
+              <a:rPr lang="en-US" b="1" i="1" dirty="0" smtClean="0">
+                <a:solidFill>
+                  <a:srgbClr val="000066"/>
+                </a:solidFill>
+              </a:rPr>
+              <a:t>Test variables such as past volatility &amp; volume</a:t>
+            </a:r>
+          </a:p>
+          <a:p>
+            <a:pPr marL="285750" indent="-285750">
+              <a:buFont typeface="Arial" panose="020B0604020202020204" pitchFamily="34" charset="0"/>
+              <a:buChar char="•"/>
+            </a:pPr>
+            <a:endParaRPr lang="en-US" b="1" i="1" dirty="0" smtClean="0">
+              <a:solidFill>
+                <a:srgbClr val="000066"/>
+              </a:solidFill>
+            </a:endParaRPr>
+          </a:p>
+          <a:p>
+            <a:pPr marL="285750" indent="-285750">
+              <a:buFont typeface="Arial" panose="020B0604020202020204" pitchFamily="34" charset="0"/>
+              <a:buChar char="•"/>
+            </a:pPr>
+            <a:endParaRPr lang="en-US" b="1" i="1" dirty="0">
+              <a:solidFill>
+                <a:srgbClr val="000066"/>
+              </a:solidFill>
+            </a:endParaRPr>
+          </a:p>
+          <a:p>
+            <a:r>
+              <a:rPr lang="en-US" b="1" dirty="0">
+                <a:solidFill>
+                  <a:srgbClr val="000066"/>
+                </a:solidFill>
+              </a:rPr>
+              <a:t>Automate a process to scan for these events</a:t>
+            </a:r>
+          </a:p>
+          <a:p>
+            <a:endParaRPr lang="en-US" b="1" dirty="0">
+              <a:solidFill>
+                <a:srgbClr val="000066"/>
+              </a:solidFill>
+            </a:endParaRPr>
+          </a:p>
+          <a:p>
+            <a:pPr marL="285750" indent="-285750">
+              <a:buFont typeface="Arial" panose="020B0604020202020204" pitchFamily="34" charset="0"/>
+              <a:buChar char="•"/>
+            </a:pPr>
+            <a:r>
+              <a:rPr lang="en-US" b="1" i="1" dirty="0" smtClean="0">
+                <a:solidFill>
+                  <a:srgbClr val="000066"/>
+                </a:solidFill>
+              </a:rPr>
+              <a:t>Create an app to detect events, give an alert after the bounce back</a:t>
+            </a:r>
+            <a:endParaRPr lang="en-US" b="1" i="1" dirty="0">
+              <a:solidFill>
+                <a:srgbClr val="000066"/>
+              </a:solidFill>
+            </a:endParaRPr>
+          </a:p>
+          <a:p>
+            <a:pPr marL="285750" indent="-285750">
+              <a:buFont typeface="Arial" panose="020B0604020202020204" pitchFamily="34" charset="0"/>
+              <a:buChar char="•"/>
+            </a:pPr>
+            <a:r>
+              <a:rPr lang="en-US" b="1" i="1" dirty="0" smtClean="0">
+                <a:solidFill>
+                  <a:srgbClr val="000066"/>
+                </a:solidFill>
+              </a:rPr>
+              <a:t>Set up a bot to make buy/sell orders based on our criteria</a:t>
+            </a:r>
+            <a:endParaRPr lang="en-US" b="1" i="1" dirty="0">
+              <a:solidFill>
+                <a:srgbClr val="000066"/>
+              </a:solidFill>
+            </a:endParaRPr>
+          </a:p>
+          <a:p>
+            <a:endParaRPr lang="en-US" b="1" dirty="0" smtClean="0">
+              <a:solidFill>
+                <a:srgbClr val="000066"/>
+              </a:solidFill>
+            </a:endParaRPr>
           </a:p>
         </p:txBody>
       </p:sp>
@@ -10915,6 +11748,84 @@
   <p:clrMapOvr>
     <a:masterClrMapping/>
   </p:clrMapOvr>
+  <p:timing>
+    <p:tnLst>
+      <p:par>
+        <p:cTn id="1" dur="indefinite" restart="never" nodeType="tmRoot">
+          <p:childTnLst>
+            <p:seq concurrent="1" nextAc="seek">
+              <p:cTn id="2" dur="indefinite" nodeType="mainSeq">
+                <p:childTnLst>
+                  <p:par>
+                    <p:cTn id="3" fill="hold">
+                      <p:stCondLst>
+                        <p:cond delay="indefinite"/>
+                      </p:stCondLst>
+                      <p:childTnLst>
+                        <p:par>
+                          <p:cTn id="4" fill="hold">
+                            <p:stCondLst>
+                              <p:cond delay="0"/>
+                            </p:stCondLst>
+                            <p:childTnLst>
+                              <p:par>
+                                <p:cTn id="5" presetID="1" presetClass="entr" presetSubtype="0" fill="hold" grpId="0" nodeType="clickEffect">
+                                  <p:stCondLst>
+                                    <p:cond delay="0"/>
+                                  </p:stCondLst>
+                                  <p:childTnLst>
+                                    <p:set>
+                                      <p:cBhvr>
+                                        <p:cTn id="6" dur="1" fill="hold">
+                                          <p:stCondLst>
+                                            <p:cond delay="0"/>
+                                          </p:stCondLst>
+                                        </p:cTn>
+                                        <p:tgtEl>
+                                          <p:spTgt spid="4"/>
+                                        </p:tgtEl>
+                                        <p:attrNameLst>
+                                          <p:attrName>style.visibility</p:attrName>
+                                        </p:attrNameLst>
+                                      </p:cBhvr>
+                                      <p:to>
+                                        <p:strVal val="visible"/>
+                                      </p:to>
+                                    </p:set>
+                                  </p:childTnLst>
+                                </p:cTn>
+                              </p:par>
+                            </p:childTnLst>
+                          </p:cTn>
+                        </p:par>
+                      </p:childTnLst>
+                    </p:cTn>
+                  </p:par>
+                </p:childTnLst>
+              </p:cTn>
+              <p:prevCondLst>
+                <p:cond evt="onPrev" delay="0">
+                  <p:tgtEl>
+                    <p:sldTgt/>
+                  </p:tgtEl>
+                </p:cond>
+              </p:prevCondLst>
+              <p:nextCondLst>
+                <p:cond evt="onNext" delay="0">
+                  <p:tgtEl>
+                    <p:sldTgt/>
+                  </p:tgtEl>
+                </p:cond>
+              </p:nextCondLst>
+            </p:seq>
+          </p:childTnLst>
+        </p:cTn>
+      </p:par>
+    </p:tnLst>
+    <p:bldLst>
+      <p:bldP spid="4" grpId="0"/>
+    </p:bldLst>
+  </p:timing>
 </p:sld>
 </file>
 
@@ -10955,7 +11866,7 @@
           <a:graphicData uri="http://schemas.openxmlformats.org/presentationml/2006/ole">
             <mc:AlternateContent xmlns:mc="http://schemas.openxmlformats.org/markup-compatibility/2006">
               <mc:Choice xmlns:v="urn:schemas-microsoft-com:vml" Requires="v">
-                <p:oleObj spid="_x0000_s3074" r:id="rId5" imgW="0" imgH="0" progId="TCLayout.ActiveDocument.1">
+                <p:oleObj spid="_x0000_s3077" r:id="rId5" imgW="0" imgH="0" progId="TCLayout.ActiveDocument.1">
                   <p:embed/>
                 </p:oleObj>
               </mc:Choice>
@@ -11061,7 +11972,7 @@
           <p:cNvPr id="6" name="TextBox 5">
             <a:extLst>
               <a:ext uri="{FF2B5EF4-FFF2-40B4-BE49-F238E27FC236}">
-                <a16:creationId xmlns:a16="http://schemas.microsoft.com/office/drawing/2014/main" id="{0C7F0FDA-5F46-41BD-BF0F-A903C866FD37}"/>
+                <a16:creationId xmlns:a16="http://schemas.microsoft.com/office/drawing/2014/main" xmlns="" id="{0C7F0FDA-5F46-41BD-BF0F-A903C866FD37}"/>
               </a:ext>
             </a:extLst>
           </p:cNvPr>
@@ -11100,7 +12011,7 @@
           <p:cNvPr id="8" name="TextBox 7">
             <a:extLst>
               <a:ext uri="{FF2B5EF4-FFF2-40B4-BE49-F238E27FC236}">
-                <a16:creationId xmlns:a16="http://schemas.microsoft.com/office/drawing/2014/main" id="{7FDC7CAA-A9D5-461C-94AF-C8FCB40CB859}"/>
+                <a16:creationId xmlns:a16="http://schemas.microsoft.com/office/drawing/2014/main" xmlns="" id="{7FDC7CAA-A9D5-461C-94AF-C8FCB40CB859}"/>
               </a:ext>
             </a:extLst>
           </p:cNvPr>
@@ -11146,7 +12057,7 @@
           <p:cNvPr id="9" name="TextBox 8">
             <a:extLst>
               <a:ext uri="{FF2B5EF4-FFF2-40B4-BE49-F238E27FC236}">
-                <a16:creationId xmlns:a16="http://schemas.microsoft.com/office/drawing/2014/main" id="{C7BE35D0-0DDA-4BE4-BFDD-F2FA63A36A32}"/>
+                <a16:creationId xmlns:a16="http://schemas.microsoft.com/office/drawing/2014/main" xmlns="" id="{C7BE35D0-0DDA-4BE4-BFDD-F2FA63A36A32}"/>
               </a:ext>
             </a:extLst>
           </p:cNvPr>
@@ -11185,7 +12096,7 @@
           <p:cNvPr id="10" name="TextBox 9">
             <a:extLst>
               <a:ext uri="{FF2B5EF4-FFF2-40B4-BE49-F238E27FC236}">
-                <a16:creationId xmlns:a16="http://schemas.microsoft.com/office/drawing/2014/main" id="{376AF7DA-345A-469B-AA8A-F827385FD190}"/>
+                <a16:creationId xmlns:a16="http://schemas.microsoft.com/office/drawing/2014/main" xmlns="" id="{376AF7DA-345A-469B-AA8A-F827385FD190}"/>
               </a:ext>
             </a:extLst>
           </p:cNvPr>
@@ -11214,7 +12125,23 @@
                   <a:srgbClr val="000066"/>
                 </a:solidFill>
               </a:rPr>
-              <a:t>The market reaction  typically causes a steep and rapid decline in price value </a:t>
+              <a:t>The market reaction </a:t>
+            </a:r>
+            <a:r>
+              <a:rPr lang="en-US" sz="2400" b="1" dirty="0" smtClean="0">
+                <a:solidFill>
+                  <a:srgbClr val="000066"/>
+                </a:solidFill>
+              </a:rPr>
+              <a:t>typically </a:t>
+            </a:r>
+            <a:r>
+              <a:rPr lang="en-US" sz="2400" b="1" dirty="0">
+                <a:solidFill>
+                  <a:srgbClr val="000066"/>
+                </a:solidFill>
+              </a:rPr>
+              <a:t>causes a steep and rapid decline in price value </a:t>
             </a:r>
           </a:p>
           <a:p>
@@ -11261,7 +12188,7 @@
           <p:cNvPr id="22530" name="Picture 2" descr="Image result for stock market chart pictures">
             <a:extLst>
               <a:ext uri="{FF2B5EF4-FFF2-40B4-BE49-F238E27FC236}">
-                <a16:creationId xmlns:a16="http://schemas.microsoft.com/office/drawing/2014/main" id="{B6E261C0-D1F9-4D86-A8FC-7C37CC741C58}"/>
+                <a16:creationId xmlns:a16="http://schemas.microsoft.com/office/drawing/2014/main" xmlns="" id="{B6E261C0-D1F9-4D86-A8FC-7C37CC741C58}"/>
               </a:ext>
             </a:extLst>
           </p:cNvPr>
@@ -11412,7 +12339,7 @@
           <p:cNvPr id="5" name="Rectangle 2">
             <a:extLst>
               <a:ext uri="{FF2B5EF4-FFF2-40B4-BE49-F238E27FC236}">
-                <a16:creationId xmlns:a16="http://schemas.microsoft.com/office/drawing/2014/main" id="{B46E0A87-1915-4F74-A2DA-E556CAEBAC44}"/>
+                <a16:creationId xmlns:a16="http://schemas.microsoft.com/office/drawing/2014/main" xmlns="" id="{B46E0A87-1915-4F74-A2DA-E556CAEBAC44}"/>
               </a:ext>
             </a:extLst>
           </p:cNvPr>
@@ -11510,7 +12437,7 @@
           <p:cNvPr id="6" name="Rectangle 2">
             <a:extLst>
               <a:ext uri="{FF2B5EF4-FFF2-40B4-BE49-F238E27FC236}">
-                <a16:creationId xmlns:a16="http://schemas.microsoft.com/office/drawing/2014/main" id="{022D944A-7D95-4176-971B-BA4CECC293DE}"/>
+                <a16:creationId xmlns:a16="http://schemas.microsoft.com/office/drawing/2014/main" xmlns="" id="{022D944A-7D95-4176-971B-BA4CECC293DE}"/>
               </a:ext>
             </a:extLst>
           </p:cNvPr>
@@ -11682,7 +12609,7 @@
           <p:cNvPr id="12" name="Picture 11">
             <a:extLst>
               <a:ext uri="{FF2B5EF4-FFF2-40B4-BE49-F238E27FC236}">
-                <a16:creationId xmlns:a16="http://schemas.microsoft.com/office/drawing/2014/main" id="{8A9048FB-48F8-4C30-986F-7C915575C23A}"/>
+                <a16:creationId xmlns:a16="http://schemas.microsoft.com/office/drawing/2014/main" xmlns="" id="{8A9048FB-48F8-4C30-986F-7C915575C23A}"/>
               </a:ext>
             </a:extLst>
           </p:cNvPr>
@@ -11727,7 +12654,7 @@
           <a:graphicData uri="http://schemas.openxmlformats.org/presentationml/2006/ole">
             <mc:AlternateContent xmlns:mc="http://schemas.openxmlformats.org/markup-compatibility/2006">
               <mc:Choice xmlns:v="urn:schemas-microsoft-com:vml" Requires="v">
-                <p:oleObj spid="_x0000_s4098" r:id="rId6" imgW="0" imgH="0" progId="TCLayout.ActiveDocument.1">
+                <p:oleObj spid="_x0000_s4101" r:id="rId6" imgW="0" imgH="0" progId="TCLayout.ActiveDocument.1">
                   <p:embed/>
                 </p:oleObj>
               </mc:Choice>
@@ -11833,7 +12760,7 @@
           <p:cNvPr id="6" name="Rectangle 5">
             <a:extLst>
               <a:ext uri="{FF2B5EF4-FFF2-40B4-BE49-F238E27FC236}">
-                <a16:creationId xmlns:a16="http://schemas.microsoft.com/office/drawing/2014/main" id="{698C65BD-9A46-453A-A68D-4269B1E00E08}"/>
+                <a16:creationId xmlns:a16="http://schemas.microsoft.com/office/drawing/2014/main" xmlns="" id="{698C65BD-9A46-453A-A68D-4269B1E00E08}"/>
               </a:ext>
             </a:extLst>
           </p:cNvPr>
@@ -11886,7 +12813,7 @@
           <p:cNvPr id="11" name="Rectangle 2">
             <a:extLst>
               <a:ext uri="{FF2B5EF4-FFF2-40B4-BE49-F238E27FC236}">
-                <a16:creationId xmlns:a16="http://schemas.microsoft.com/office/drawing/2014/main" id="{340A7B56-754B-452D-844A-C81239CEB0F3}"/>
+                <a16:creationId xmlns:a16="http://schemas.microsoft.com/office/drawing/2014/main" xmlns="" id="{340A7B56-754B-452D-844A-C81239CEB0F3}"/>
               </a:ext>
             </a:extLst>
           </p:cNvPr>
@@ -11981,7 +12908,7 @@
           <p:cNvPr id="7" name="Picture 6">
             <a:extLst>
               <a:ext uri="{FF2B5EF4-FFF2-40B4-BE49-F238E27FC236}">
-                <a16:creationId xmlns:a16="http://schemas.microsoft.com/office/drawing/2014/main" id="{C5EE6EC4-4BE2-4069-8B8B-0417E27AC082}"/>
+                <a16:creationId xmlns:a16="http://schemas.microsoft.com/office/drawing/2014/main" xmlns="" id="{C5EE6EC4-4BE2-4069-8B8B-0417E27AC082}"/>
               </a:ext>
             </a:extLst>
           </p:cNvPr>
@@ -12026,7 +12953,7 @@
           <a:graphicData uri="http://schemas.openxmlformats.org/presentationml/2006/ole">
             <mc:AlternateContent xmlns:mc="http://schemas.openxmlformats.org/markup-compatibility/2006">
               <mc:Choice xmlns:v="urn:schemas-microsoft-com:vml" Requires="v">
-                <p:oleObj spid="_x0000_s5122" r:id="rId6" imgW="0" imgH="0" progId="TCLayout.ActiveDocument.1">
+                <p:oleObj spid="_x0000_s5125" r:id="rId6" imgW="0" imgH="0" progId="TCLayout.ActiveDocument.1">
                   <p:embed/>
                 </p:oleObj>
               </mc:Choice>
@@ -12132,7 +13059,7 @@
           <p:cNvPr id="6" name="Rectangle 5">
             <a:extLst>
               <a:ext uri="{FF2B5EF4-FFF2-40B4-BE49-F238E27FC236}">
-                <a16:creationId xmlns:a16="http://schemas.microsoft.com/office/drawing/2014/main" id="{698C65BD-9A46-453A-A68D-4269B1E00E08}"/>
+                <a16:creationId xmlns:a16="http://schemas.microsoft.com/office/drawing/2014/main" xmlns="" id="{698C65BD-9A46-453A-A68D-4269B1E00E08}"/>
               </a:ext>
             </a:extLst>
           </p:cNvPr>
@@ -12185,7 +13112,7 @@
           <p:cNvPr id="8" name="Rectangle 2">
             <a:extLst>
               <a:ext uri="{FF2B5EF4-FFF2-40B4-BE49-F238E27FC236}">
-                <a16:creationId xmlns:a16="http://schemas.microsoft.com/office/drawing/2014/main" id="{A0F6F584-AA39-43E1-9604-EAA1E6B54356}"/>
+                <a16:creationId xmlns:a16="http://schemas.microsoft.com/office/drawing/2014/main" xmlns="" id="{A0F6F584-AA39-43E1-9604-EAA1E6B54356}"/>
               </a:ext>
             </a:extLst>
           </p:cNvPr>
@@ -12267,7 +13194,7 @@
           <p:cNvPr id="8" name="Picture 7">
             <a:extLst>
               <a:ext uri="{FF2B5EF4-FFF2-40B4-BE49-F238E27FC236}">
-                <a16:creationId xmlns:a16="http://schemas.microsoft.com/office/drawing/2014/main" id="{B0FA6173-F0EE-464D-A108-3A58E435A159}"/>
+                <a16:creationId xmlns:a16="http://schemas.microsoft.com/office/drawing/2014/main" xmlns="" id="{B0FA6173-F0EE-464D-A108-3A58E435A159}"/>
               </a:ext>
             </a:extLst>
           </p:cNvPr>
@@ -12312,7 +13239,7 @@
           <a:graphicData uri="http://schemas.openxmlformats.org/presentationml/2006/ole">
             <mc:AlternateContent xmlns:mc="http://schemas.openxmlformats.org/markup-compatibility/2006">
               <mc:Choice xmlns:v="urn:schemas-microsoft-com:vml" Requires="v">
-                <p:oleObj spid="_x0000_s6146" r:id="rId6" imgW="0" imgH="0" progId="TCLayout.ActiveDocument.1">
+                <p:oleObj spid="_x0000_s6149" r:id="rId6" imgW="0" imgH="0" progId="TCLayout.ActiveDocument.1">
                   <p:embed/>
                 </p:oleObj>
               </mc:Choice>
@@ -12418,7 +13345,7 @@
           <p:cNvPr id="6" name="Rectangle 5">
             <a:extLst>
               <a:ext uri="{FF2B5EF4-FFF2-40B4-BE49-F238E27FC236}">
-                <a16:creationId xmlns:a16="http://schemas.microsoft.com/office/drawing/2014/main" id="{698C65BD-9A46-453A-A68D-4269B1E00E08}"/>
+                <a16:creationId xmlns:a16="http://schemas.microsoft.com/office/drawing/2014/main" xmlns="" id="{698C65BD-9A46-453A-A68D-4269B1E00E08}"/>
               </a:ext>
             </a:extLst>
           </p:cNvPr>
@@ -12471,7 +13398,7 @@
           <p:cNvPr id="7" name="Rectangle 2">
             <a:extLst>
               <a:ext uri="{FF2B5EF4-FFF2-40B4-BE49-F238E27FC236}">
-                <a16:creationId xmlns:a16="http://schemas.microsoft.com/office/drawing/2014/main" id="{8D1C1748-2A39-4102-8731-AE1D93803BCF}"/>
+                <a16:creationId xmlns:a16="http://schemas.microsoft.com/office/drawing/2014/main" xmlns="" id="{8D1C1748-2A39-4102-8731-AE1D93803BCF}"/>
               </a:ext>
             </a:extLst>
           </p:cNvPr>
@@ -12577,7 +13504,7 @@
           <p:cNvPr id="7" name="Picture 6">
             <a:extLst>
               <a:ext uri="{FF2B5EF4-FFF2-40B4-BE49-F238E27FC236}">
-                <a16:creationId xmlns:a16="http://schemas.microsoft.com/office/drawing/2014/main" id="{B9FD2707-B71F-4744-B2A4-ADC2ECEC1283}"/>
+                <a16:creationId xmlns:a16="http://schemas.microsoft.com/office/drawing/2014/main" xmlns="" id="{B9FD2707-B71F-4744-B2A4-ADC2ECEC1283}"/>
               </a:ext>
             </a:extLst>
           </p:cNvPr>
@@ -12622,7 +13549,7 @@
           <a:graphicData uri="http://schemas.openxmlformats.org/presentationml/2006/ole">
             <mc:AlternateContent xmlns:mc="http://schemas.openxmlformats.org/markup-compatibility/2006">
               <mc:Choice xmlns:v="urn:schemas-microsoft-com:vml" Requires="v">
-                <p:oleObj spid="_x0000_s7170" r:id="rId6" imgW="0" imgH="0" progId="TCLayout.ActiveDocument.1">
+                <p:oleObj spid="_x0000_s7173" r:id="rId6" imgW="0" imgH="0" progId="TCLayout.ActiveDocument.1">
                   <p:embed/>
                 </p:oleObj>
               </mc:Choice>
@@ -12728,7 +13655,7 @@
           <p:cNvPr id="6" name="Rectangle 5">
             <a:extLst>
               <a:ext uri="{FF2B5EF4-FFF2-40B4-BE49-F238E27FC236}">
-                <a16:creationId xmlns:a16="http://schemas.microsoft.com/office/drawing/2014/main" id="{698C65BD-9A46-453A-A68D-4269B1E00E08}"/>
+                <a16:creationId xmlns:a16="http://schemas.microsoft.com/office/drawing/2014/main" xmlns="" id="{698C65BD-9A46-453A-A68D-4269B1E00E08}"/>
               </a:ext>
             </a:extLst>
           </p:cNvPr>
@@ -12781,7 +13708,7 @@
           <p:cNvPr id="8" name="Rectangle 2">
             <a:extLst>
               <a:ext uri="{FF2B5EF4-FFF2-40B4-BE49-F238E27FC236}">
-                <a16:creationId xmlns:a16="http://schemas.microsoft.com/office/drawing/2014/main" id="{EBB7618E-C02E-4758-99D0-24877A2AAF7D}"/>
+                <a16:creationId xmlns:a16="http://schemas.microsoft.com/office/drawing/2014/main" xmlns="" id="{EBB7618E-C02E-4758-99D0-24877A2AAF7D}"/>
               </a:ext>
             </a:extLst>
           </p:cNvPr>
@@ -12863,7 +13790,7 @@
           <p:cNvPr id="8" name="Picture 7">
             <a:extLst>
               <a:ext uri="{FF2B5EF4-FFF2-40B4-BE49-F238E27FC236}">
-                <a16:creationId xmlns:a16="http://schemas.microsoft.com/office/drawing/2014/main" id="{82086EB5-1358-4AC3-9DEF-33919E829BAE}"/>
+                <a16:creationId xmlns:a16="http://schemas.microsoft.com/office/drawing/2014/main" xmlns="" id="{82086EB5-1358-4AC3-9DEF-33919E829BAE}"/>
               </a:ext>
             </a:extLst>
           </p:cNvPr>
@@ -12908,7 +13835,7 @@
           <a:graphicData uri="http://schemas.openxmlformats.org/presentationml/2006/ole">
             <mc:AlternateContent xmlns:mc="http://schemas.openxmlformats.org/markup-compatibility/2006">
               <mc:Choice xmlns:v="urn:schemas-microsoft-com:vml" Requires="v">
-                <p:oleObj spid="_x0000_s8194" r:id="rId6" imgW="0" imgH="0" progId="TCLayout.ActiveDocument.1">
+                <p:oleObj spid="_x0000_s8198" r:id="rId6" imgW="0" imgH="0" progId="TCLayout.ActiveDocument.1">
                   <p:embed/>
                 </p:oleObj>
               </mc:Choice>
@@ -12999,13 +13926,26 @@
           <a:p>
             <a:pPr algn="l"/>
             <a:r>
-              <a:rPr lang="en-US" sz="1800" b="1" dirty="0">
+              <a:rPr lang="en-US" sz="2400" b="1" dirty="0">
                 <a:solidFill>
                   <a:srgbClr val="000066"/>
                 </a:solidFill>
               </a:rPr>
-              <a:t>Environmental or Ecological Hazzard</a:t>
-            </a:r>
+              <a:t>Environmental or Ecological </a:t>
+            </a:r>
+            <a:r>
+              <a:rPr lang="en-US" sz="2400" b="1" dirty="0" smtClean="0">
+                <a:solidFill>
+                  <a:srgbClr val="000066"/>
+                </a:solidFill>
+              </a:rPr>
+              <a:t>Hazard</a:t>
+            </a:r>
+            <a:endParaRPr lang="en-US" sz="2400" b="1" dirty="0">
+              <a:solidFill>
+                <a:srgbClr val="000066"/>
+              </a:solidFill>
+            </a:endParaRPr>
           </a:p>
         </p:txBody>
       </p:sp>
@@ -13014,7 +13954,7 @@
           <p:cNvPr id="6" name="Rectangle 5">
             <a:extLst>
               <a:ext uri="{FF2B5EF4-FFF2-40B4-BE49-F238E27FC236}">
-                <a16:creationId xmlns:a16="http://schemas.microsoft.com/office/drawing/2014/main" id="{698C65BD-9A46-453A-A68D-4269B1E00E08}"/>
+                <a16:creationId xmlns:a16="http://schemas.microsoft.com/office/drawing/2014/main" xmlns="" id="{698C65BD-9A46-453A-A68D-4269B1E00E08}"/>
               </a:ext>
             </a:extLst>
           </p:cNvPr>
@@ -13067,7 +14007,7 @@
           <p:cNvPr id="7" name="Rectangle 2">
             <a:extLst>
               <a:ext uri="{FF2B5EF4-FFF2-40B4-BE49-F238E27FC236}">
-                <a16:creationId xmlns:a16="http://schemas.microsoft.com/office/drawing/2014/main" id="{35000BDB-792B-4F51-871C-89BA4DA41FFC}"/>
+                <a16:creationId xmlns:a16="http://schemas.microsoft.com/office/drawing/2014/main" xmlns="" id="{35000BDB-792B-4F51-871C-89BA4DA41FFC}"/>
               </a:ext>
             </a:extLst>
           </p:cNvPr>

</xml_diff>